<commit_message>
Updated the power point - removed an extra slide
</commit_message>
<xml_diff>
--- a/Portfolio_Diversifier.pptx
+++ b/Portfolio_Diversifier.pptx
@@ -23,7 +23,6 @@
     <p:sldId id="290" r:id="rId17"/>
     <p:sldId id="292" r:id="rId18"/>
     <p:sldId id="293" r:id="rId19"/>
-    <p:sldId id="294" r:id="rId20"/>
   </p:sldIdLst>
   <p:sldSz cx="12192000" cy="6858000"/>
   <p:notesSz cx="6858000" cy="9144000"/>
@@ -19048,61 +19047,6 @@
 </p:sld>
 </file>
 
-<file path=ppt/slides/slide19.xml><?xml version="1.0" encoding="utf-8"?>
-<p:sld xmlns:a="http://schemas.openxmlformats.org/drawingml/2006/main" xmlns:r="http://schemas.openxmlformats.org/officeDocument/2006/relationships" xmlns:p="http://schemas.openxmlformats.org/presentationml/2006/main">
-  <p:cSld>
-    <p:spTree>
-      <p:nvGrpSpPr>
-        <p:cNvPr id="1" name=""/>
-        <p:cNvGrpSpPr/>
-        <p:nvPr/>
-      </p:nvGrpSpPr>
-      <p:grpSpPr>
-        <a:xfrm>
-          <a:off x="0" y="0"/>
-          <a:ext cx="0" cy="0"/>
-          <a:chOff x="0" y="0"/>
-          <a:chExt cx="0" cy="0"/>
-        </a:xfrm>
-      </p:grpSpPr>
-      <p:sp>
-        <p:nvSpPr>
-          <p:cNvPr id="2" name="Title 1">
-            <a:extLst>
-              <a:ext uri="{FF2B5EF4-FFF2-40B4-BE49-F238E27FC236}">
-                <a16:creationId xmlns:a16="http://schemas.microsoft.com/office/drawing/2014/main" id="{06EBBF74-5278-4E14-BFC6-319F2F26BE49}"/>
-              </a:ext>
-            </a:extLst>
-          </p:cNvPr>
-          <p:cNvSpPr>
-            <a:spLocks noGrp="1"/>
-          </p:cNvSpPr>
-          <p:nvPr>
-            <p:ph type="title"/>
-          </p:nvPr>
-        </p:nvSpPr>
-        <p:spPr/>
-        <p:txBody>
-          <a:bodyPr/>
-          <a:lstStyle/>
-          <a:p>
-            <a:endParaRPr lang="en-US"/>
-          </a:p>
-        </p:txBody>
-      </p:sp>
-    </p:spTree>
-    <p:extLst>
-      <p:ext uri="{BB962C8B-B14F-4D97-AF65-F5344CB8AC3E}">
-        <p14:creationId xmlns:p14="http://schemas.microsoft.com/office/powerpoint/2010/main" val="3421722547"/>
-      </p:ext>
-    </p:extLst>
-  </p:cSld>
-  <p:clrMapOvr>
-    <a:masterClrMapping/>
-  </p:clrMapOvr>
-</p:sld>
-</file>
-
 <file path=ppt/slides/slide2.xml><?xml version="1.0" encoding="utf-8"?>
 <p:sld xmlns:a="http://schemas.openxmlformats.org/drawingml/2006/main" xmlns:r="http://schemas.openxmlformats.org/officeDocument/2006/relationships" xmlns:p="http://schemas.openxmlformats.org/presentationml/2006/main">
   <p:cSld>

</xml_diff>

<commit_message>
Added the conclusion slide
</commit_message>
<xml_diff>
--- a/Portfolio_Diversifier.pptx
+++ b/Portfolio_Diversifier.pptx
@@ -21,8 +21,9 @@
     <p:sldId id="288" r:id="rId15"/>
     <p:sldId id="284" r:id="rId16"/>
     <p:sldId id="290" r:id="rId17"/>
-    <p:sldId id="292" r:id="rId18"/>
-    <p:sldId id="293" r:id="rId19"/>
+    <p:sldId id="294" r:id="rId18"/>
+    <p:sldId id="292" r:id="rId19"/>
+    <p:sldId id="293" r:id="rId20"/>
   </p:sldIdLst>
   <p:sldSz cx="12192000" cy="6858000"/>
   <p:notesSz cx="6858000" cy="9144000"/>
@@ -17716,7 +17717,7 @@
                   <a:schemeClr val="bg1"/>
                 </a:solidFill>
               </a:rPr>
-              <a:t>Future Enhancements</a:t>
+              <a:t>Conclusions</a:t>
             </a:r>
           </a:p>
         </p:txBody>
@@ -17745,17 +17746,25 @@
         </p:spPr>
         <p:txBody>
           <a:bodyPr>
-            <a:normAutofit fontScale="92500" lnSpcReduction="20000"/>
+            <a:normAutofit/>
           </a:bodyPr>
           <a:lstStyle/>
           <a:p>
+            <a:r>
+              <a:rPr lang="en-US" dirty="0" err="1">
+                <a:solidFill>
+                  <a:schemeClr val="bg1"/>
+                </a:solidFill>
+              </a:rPr>
+              <a:t>tlt</a:t>
+            </a:r>
             <a:r>
               <a:rPr lang="en-US" dirty="0">
                 <a:solidFill>
                   <a:schemeClr val="bg1"/>
                 </a:solidFill>
               </a:rPr>
-              <a:t>Release the MVP to the early adopters</a:t>
+              <a:t> is the best diversifier</a:t>
             </a:r>
           </a:p>
           <a:p>
@@ -17765,7 +17774,7 @@
                   <a:schemeClr val="bg1"/>
                 </a:solidFill>
               </a:rPr>
-              <a:t>Productize the MVP &amp; Make it web based</a:t>
+              <a:t>WARP allows us to easily identify a good diversifier and does not suffer from some of the flaws of common ratios such as Sharpe</a:t>
             </a:r>
           </a:p>
           <a:p>
@@ -17775,77 +17784,7 @@
                   <a:schemeClr val="bg1"/>
                 </a:solidFill>
               </a:rPr>
-              <a:t>Provide Daily and Monthly Rebalancing of Portfolios</a:t>
-            </a:r>
-          </a:p>
-          <a:p>
-            <a:r>
-              <a:rPr lang="en-US" dirty="0">
-                <a:solidFill>
-                  <a:schemeClr val="bg1"/>
-                </a:solidFill>
-              </a:rPr>
-              <a:t>Provide Optimization of Portfolio based on tickers selected. </a:t>
-            </a:r>
-          </a:p>
-          <a:p>
-            <a:r>
-              <a:rPr lang="en-US" dirty="0">
-                <a:solidFill>
-                  <a:schemeClr val="bg1"/>
-                </a:solidFill>
-              </a:rPr>
-              <a:t>Flexibility with adding tickers                                                            </a:t>
-            </a:r>
-          </a:p>
-          <a:p>
-            <a:r>
-              <a:rPr lang="en-US" dirty="0">
-                <a:solidFill>
-                  <a:schemeClr val="bg1"/>
-                </a:solidFill>
-              </a:rPr>
-              <a:t>Add Customized Portfolios &amp; recursively add portfolios</a:t>
-            </a:r>
-          </a:p>
-          <a:p>
-            <a:r>
-              <a:rPr lang="en-US" dirty="0">
-                <a:solidFill>
-                  <a:schemeClr val="bg1"/>
-                </a:solidFill>
-              </a:rPr>
-              <a:t>Integrate UI with Dash</a:t>
-            </a:r>
-          </a:p>
-          <a:p>
-            <a:r>
-              <a:rPr lang="en-US" dirty="0">
-                <a:solidFill>
-                  <a:schemeClr val="bg1"/>
-                </a:solidFill>
-              </a:rPr>
-              <a:t>Tiered Pricing with Premium Personal &amp; Specialized Support                                            </a:t>
-            </a:r>
-          </a:p>
-          <a:p>
-            <a:r>
-              <a:rPr lang="en-US" dirty="0">
-                <a:solidFill>
-                  <a:schemeClr val="bg1"/>
-                </a:solidFill>
-              </a:rPr>
-              <a:t>Add options to change portfolio weights </a:t>
-            </a:r>
-          </a:p>
-          <a:p>
-            <a:r>
-              <a:rPr lang="en-US" dirty="0">
-                <a:solidFill>
-                  <a:schemeClr val="bg1"/>
-                </a:solidFill>
-              </a:rPr>
-              <a:t>Add Treynor, Information ratio and other diversification metrics for comparison                                       </a:t>
+              <a:t>Diversifier identified by WARP allows us to perform better than the market in both the bull and bear periods.</a:t>
             </a:r>
           </a:p>
         </p:txBody>
@@ -18201,6 +18140,511 @@
         </p:nvSpPr>
         <p:spPr>
           <a:xfrm>
+            <a:off x="696528" y="158115"/>
+            <a:ext cx="5958038" cy="707886"/>
+          </a:xfrm>
+          <a:prstGeom prst="rect">
+            <a:avLst/>
+          </a:prstGeom>
+          <a:noFill/>
+        </p:spPr>
+        <p:txBody>
+          <a:bodyPr wrap="square" rtlCol="0">
+            <a:spAutoFit/>
+          </a:bodyPr>
+          <a:lstStyle/>
+          <a:p>
+            <a:r>
+              <a:rPr lang="en-US" sz="4000" dirty="0">
+                <a:solidFill>
+                  <a:schemeClr val="bg1"/>
+                </a:solidFill>
+              </a:rPr>
+              <a:t>Future Enhancements</a:t>
+            </a:r>
+          </a:p>
+        </p:txBody>
+      </p:sp>
+      <p:sp>
+        <p:nvSpPr>
+          <p:cNvPr id="7" name="Content Placeholder 2">
+            <a:extLst>
+              <a:ext uri="{FF2B5EF4-FFF2-40B4-BE49-F238E27FC236}">
+                <a16:creationId xmlns:a16="http://schemas.microsoft.com/office/drawing/2014/main" id="{DF70BA40-0EE4-41ED-8C57-FADEA3B94489}"/>
+              </a:ext>
+            </a:extLst>
+          </p:cNvPr>
+          <p:cNvSpPr>
+            <a:spLocks noGrp="1"/>
+          </p:cNvSpPr>
+          <p:nvPr>
+            <p:ph idx="1"/>
+          </p:nvPr>
+        </p:nvSpPr>
+        <p:spPr>
+          <a:xfrm>
+            <a:off x="696528" y="1253117"/>
+            <a:ext cx="10515600" cy="4351338"/>
+          </a:xfrm>
+        </p:spPr>
+        <p:txBody>
+          <a:bodyPr>
+            <a:normAutofit fontScale="92500" lnSpcReduction="20000"/>
+          </a:bodyPr>
+          <a:lstStyle/>
+          <a:p>
+            <a:r>
+              <a:rPr lang="en-US" dirty="0">
+                <a:solidFill>
+                  <a:schemeClr val="bg1"/>
+                </a:solidFill>
+              </a:rPr>
+              <a:t>Release the MVP to the early adopters</a:t>
+            </a:r>
+          </a:p>
+          <a:p>
+            <a:r>
+              <a:rPr lang="en-US" dirty="0">
+                <a:solidFill>
+                  <a:schemeClr val="bg1"/>
+                </a:solidFill>
+              </a:rPr>
+              <a:t>Productize the MVP &amp; Make it web based</a:t>
+            </a:r>
+          </a:p>
+          <a:p>
+            <a:r>
+              <a:rPr lang="en-US" dirty="0">
+                <a:solidFill>
+                  <a:schemeClr val="bg1"/>
+                </a:solidFill>
+              </a:rPr>
+              <a:t>Provide Daily and Monthly Rebalancing of Portfolios</a:t>
+            </a:r>
+          </a:p>
+          <a:p>
+            <a:r>
+              <a:rPr lang="en-US" dirty="0">
+                <a:solidFill>
+                  <a:schemeClr val="bg1"/>
+                </a:solidFill>
+              </a:rPr>
+              <a:t>Provide Optimization of Portfolio based on tickers selected. </a:t>
+            </a:r>
+          </a:p>
+          <a:p>
+            <a:r>
+              <a:rPr lang="en-US" dirty="0">
+                <a:solidFill>
+                  <a:schemeClr val="bg1"/>
+                </a:solidFill>
+              </a:rPr>
+              <a:t>Flexibility with adding tickers                                                            </a:t>
+            </a:r>
+          </a:p>
+          <a:p>
+            <a:r>
+              <a:rPr lang="en-US" dirty="0">
+                <a:solidFill>
+                  <a:schemeClr val="bg1"/>
+                </a:solidFill>
+              </a:rPr>
+              <a:t>Add Customized Portfolios &amp; recursively add portfolios</a:t>
+            </a:r>
+          </a:p>
+          <a:p>
+            <a:r>
+              <a:rPr lang="en-US" dirty="0">
+                <a:solidFill>
+                  <a:schemeClr val="bg1"/>
+                </a:solidFill>
+              </a:rPr>
+              <a:t>Integrate UI with Dash</a:t>
+            </a:r>
+          </a:p>
+          <a:p>
+            <a:r>
+              <a:rPr lang="en-US" dirty="0">
+                <a:solidFill>
+                  <a:schemeClr val="bg1"/>
+                </a:solidFill>
+              </a:rPr>
+              <a:t>Tiered Pricing with Premium Personal &amp; Specialized Support                                            </a:t>
+            </a:r>
+          </a:p>
+          <a:p>
+            <a:r>
+              <a:rPr lang="en-US" dirty="0">
+                <a:solidFill>
+                  <a:schemeClr val="bg1"/>
+                </a:solidFill>
+              </a:rPr>
+              <a:t>Add options to change portfolio weights </a:t>
+            </a:r>
+          </a:p>
+          <a:p>
+            <a:r>
+              <a:rPr lang="en-US" dirty="0">
+                <a:solidFill>
+                  <a:schemeClr val="bg1"/>
+                </a:solidFill>
+              </a:rPr>
+              <a:t>Add Treynor, Information ratio and other diversification metrics for comparison                                       </a:t>
+            </a:r>
+          </a:p>
+        </p:txBody>
+      </p:sp>
+    </p:spTree>
+    <p:extLst>
+      <p:ext uri="{BB962C8B-B14F-4D97-AF65-F5344CB8AC3E}">
+        <p14:creationId xmlns:p14="http://schemas.microsoft.com/office/powerpoint/2010/main" val="2258085073"/>
+      </p:ext>
+    </p:extLst>
+  </p:cSld>
+  <p:clrMapOvr>
+    <a:masterClrMapping/>
+  </p:clrMapOvr>
+</p:sld>
+</file>
+
+<file path=ppt/slides/slide18.xml><?xml version="1.0" encoding="utf-8"?>
+<p:sld xmlns:a="http://schemas.openxmlformats.org/drawingml/2006/main" xmlns:r="http://schemas.openxmlformats.org/officeDocument/2006/relationships" xmlns:p="http://schemas.openxmlformats.org/presentationml/2006/main">
+  <p:cSld>
+    <p:bg>
+      <p:bgPr>
+        <a:solidFill>
+          <a:schemeClr val="bg1"/>
+        </a:solidFill>
+        <a:effectLst/>
+      </p:bgPr>
+    </p:bg>
+    <p:spTree>
+      <p:nvGrpSpPr>
+        <p:cNvPr id="1" name=""/>
+        <p:cNvGrpSpPr/>
+        <p:nvPr/>
+      </p:nvGrpSpPr>
+      <p:grpSpPr>
+        <a:xfrm>
+          <a:off x="0" y="0"/>
+          <a:ext cx="0" cy="0"/>
+          <a:chOff x="0" y="0"/>
+          <a:chExt cx="0" cy="0"/>
+        </a:xfrm>
+      </p:grpSpPr>
+      <p:sp useBgFill="1">
+        <p:nvSpPr>
+          <p:cNvPr id="10" name="Rectangle 9">
+            <a:extLst>
+              <a:ext uri="{FF2B5EF4-FFF2-40B4-BE49-F238E27FC236}">
+                <a16:creationId xmlns:a16="http://schemas.microsoft.com/office/drawing/2014/main" id="{AB8C311F-7253-4AED-9701-7FC0708C41C7}"/>
+              </a:ext>
+              <a:ext uri="{C183D7F6-B498-43B3-948B-1728B52AA6E4}">
+                <adec:decorative xmlns:adec="http://schemas.microsoft.com/office/drawing/2017/decorative" val="1"/>
+              </a:ext>
+            </a:extLst>
+          </p:cNvPr>
+          <p:cNvSpPr>
+            <a:spLocks noGrp="1" noRot="1" noChangeAspect="1" noMove="1" noResize="1" noEditPoints="1" noAdjustHandles="1" noChangeArrowheads="1" noChangeShapeType="1" noTextEdit="1"/>
+          </p:cNvSpPr>
+          <p:nvPr>
+            <p:extLst>
+              <p:ext uri="{386F3935-93C4-4BCD-93E2-E3B085C9AB24}">
+                <p16:designElem xmlns:p16="http://schemas.microsoft.com/office/powerpoint/2015/main" val="1"/>
+              </p:ext>
+            </p:extLst>
+          </p:nvPr>
+        </p:nvSpPr>
+        <p:spPr>
+          <a:xfrm>
+            <a:off x="0" y="0"/>
+            <a:ext cx="12192000" cy="6858000"/>
+          </a:xfrm>
+          <a:prstGeom prst="rect">
+            <a:avLst/>
+          </a:prstGeom>
+          <a:ln w="12700" cap="flat" cmpd="sng" algn="ctr">
+            <a:noFill/>
+            <a:prstDash val="solid"/>
+            <a:miter lim="800000"/>
+          </a:ln>
+          <a:effectLst/>
+          <a:extLst>
+            <a:ext uri="{91240B29-F687-4F45-9708-019B960494DF}">
+              <a14:hiddenLine xmlns:a14="http://schemas.microsoft.com/office/drawing/2010/main" w="12700" cap="flat" cmpd="sng" algn="ctr">
+                <a:solidFill>
+                  <a:schemeClr val="accent1">
+                    <a:shade val="50000"/>
+                  </a:schemeClr>
+                </a:solidFill>
+                <a:prstDash val="solid"/>
+                <a:miter lim="800000"/>
+              </a14:hiddenLine>
+            </a:ext>
+          </a:extLst>
+        </p:spPr>
+        <p:style>
+          <a:lnRef idx="2">
+            <a:schemeClr val="accent1">
+              <a:shade val="50000"/>
+            </a:schemeClr>
+          </a:lnRef>
+          <a:fillRef idx="1">
+            <a:schemeClr val="accent1"/>
+          </a:fillRef>
+          <a:effectRef idx="0">
+            <a:schemeClr val="accent1"/>
+          </a:effectRef>
+          <a:fontRef idx="minor">
+            <a:schemeClr val="lt1"/>
+          </a:fontRef>
+        </p:style>
+        <p:txBody>
+          <a:bodyPr rtlCol="0" anchor="ctr"/>
+          <a:lstStyle/>
+          <a:p>
+            <a:pPr algn="ctr"/>
+            <a:endParaRPr lang="en-US"/>
+          </a:p>
+        </p:txBody>
+      </p:sp>
+      <p:sp>
+        <p:nvSpPr>
+          <p:cNvPr id="12" name="Rectangle 11">
+            <a:extLst>
+              <a:ext uri="{FF2B5EF4-FFF2-40B4-BE49-F238E27FC236}">
+                <a16:creationId xmlns:a16="http://schemas.microsoft.com/office/drawing/2014/main" id="{E2384209-CB15-4CDF-9D31-C44FD9A3F20D}"/>
+              </a:ext>
+              <a:ext uri="{C183D7F6-B498-43B3-948B-1728B52AA6E4}">
+                <adec:decorative xmlns:adec="http://schemas.microsoft.com/office/drawing/2017/decorative" val="1"/>
+              </a:ext>
+            </a:extLst>
+          </p:cNvPr>
+          <p:cNvSpPr>
+            <a:spLocks noGrp="1" noRot="1" noChangeAspect="1" noMove="1" noResize="1" noEditPoints="1" noAdjustHandles="1" noChangeArrowheads="1" noChangeShapeType="1" noTextEdit="1"/>
+          </p:cNvSpPr>
+          <p:nvPr>
+            <p:extLst>
+              <p:ext uri="{386F3935-93C4-4BCD-93E2-E3B085C9AB24}">
+                <p16:designElem xmlns:p16="http://schemas.microsoft.com/office/powerpoint/2015/main" val="1"/>
+              </p:ext>
+            </p:extLst>
+          </p:nvPr>
+        </p:nvSpPr>
+        <p:spPr>
+          <a:xfrm rot="16200000" flipH="1">
+            <a:off x="2666617" y="-2666188"/>
+            <a:ext cx="6858000" cy="12191233"/>
+          </a:xfrm>
+          <a:prstGeom prst="rect">
+            <a:avLst/>
+          </a:prstGeom>
+          <a:gradFill>
+            <a:gsLst>
+              <a:gs pos="8000">
+                <a:schemeClr val="accent1"/>
+              </a:gs>
+              <a:gs pos="100000">
+                <a:schemeClr val="accent1">
+                  <a:lumMod val="50000"/>
+                </a:schemeClr>
+              </a:gs>
+            </a:gsLst>
+            <a:lin ang="12000000" scaled="0"/>
+          </a:gradFill>
+          <a:ln>
+            <a:noFill/>
+          </a:ln>
+        </p:spPr>
+        <p:style>
+          <a:lnRef idx="2">
+            <a:schemeClr val="accent1">
+              <a:shade val="50000"/>
+            </a:schemeClr>
+          </a:lnRef>
+          <a:fillRef idx="1">
+            <a:schemeClr val="accent1"/>
+          </a:fillRef>
+          <a:effectRef idx="0">
+            <a:schemeClr val="accent1"/>
+          </a:effectRef>
+          <a:fontRef idx="minor">
+            <a:schemeClr val="lt1"/>
+          </a:fontRef>
+        </p:style>
+        <p:txBody>
+          <a:bodyPr rtlCol="0" anchor="ctr"/>
+          <a:lstStyle/>
+          <a:p>
+            <a:pPr algn="ctr"/>
+            <a:endParaRPr lang="en-US"/>
+          </a:p>
+        </p:txBody>
+      </p:sp>
+      <p:sp>
+        <p:nvSpPr>
+          <p:cNvPr id="14" name="Rectangle 13">
+            <a:extLst>
+              <a:ext uri="{FF2B5EF4-FFF2-40B4-BE49-F238E27FC236}">
+                <a16:creationId xmlns:a16="http://schemas.microsoft.com/office/drawing/2014/main" id="{2633B3B5-CC90-43F0-8714-D31D1F3F0209}"/>
+              </a:ext>
+              <a:ext uri="{C183D7F6-B498-43B3-948B-1728B52AA6E4}">
+                <adec:decorative xmlns:adec="http://schemas.microsoft.com/office/drawing/2017/decorative" val="1"/>
+              </a:ext>
+            </a:extLst>
+          </p:cNvPr>
+          <p:cNvSpPr>
+            <a:spLocks noGrp="1" noRot="1" noChangeAspect="1" noMove="1" noResize="1" noEditPoints="1" noAdjustHandles="1" noChangeArrowheads="1" noChangeShapeType="1" noTextEdit="1"/>
+          </p:cNvSpPr>
+          <p:nvPr>
+            <p:extLst>
+              <p:ext uri="{386F3935-93C4-4BCD-93E2-E3B085C9AB24}">
+                <p16:designElem xmlns:p16="http://schemas.microsoft.com/office/powerpoint/2015/main" val="1"/>
+              </p:ext>
+            </p:extLst>
+          </p:nvPr>
+        </p:nvSpPr>
+        <p:spPr>
+          <a:xfrm rot="10800000" flipH="1">
+            <a:off x="-2311" y="0"/>
+            <a:ext cx="9070846" cy="6857572"/>
+          </a:xfrm>
+          <a:prstGeom prst="rect">
+            <a:avLst/>
+          </a:prstGeom>
+          <a:gradFill>
+            <a:gsLst>
+              <a:gs pos="8000">
+                <a:srgbClr val="000000">
+                  <a:alpha val="52000"/>
+                </a:srgbClr>
+              </a:gs>
+              <a:gs pos="100000">
+                <a:schemeClr val="accent1"/>
+              </a:gs>
+            </a:gsLst>
+            <a:lin ang="4800000" scaled="0"/>
+          </a:gradFill>
+          <a:ln>
+            <a:noFill/>
+          </a:ln>
+        </p:spPr>
+        <p:style>
+          <a:lnRef idx="2">
+            <a:schemeClr val="accent1">
+              <a:shade val="50000"/>
+            </a:schemeClr>
+          </a:lnRef>
+          <a:fillRef idx="1">
+            <a:schemeClr val="accent1"/>
+          </a:fillRef>
+          <a:effectRef idx="0">
+            <a:schemeClr val="accent1"/>
+          </a:effectRef>
+          <a:fontRef idx="minor">
+            <a:schemeClr val="lt1"/>
+          </a:fontRef>
+        </p:style>
+        <p:txBody>
+          <a:bodyPr rtlCol="0" anchor="ctr"/>
+          <a:lstStyle/>
+          <a:p>
+            <a:pPr algn="ctr"/>
+            <a:endParaRPr lang="en-US"/>
+          </a:p>
+        </p:txBody>
+      </p:sp>
+      <p:sp>
+        <p:nvSpPr>
+          <p:cNvPr id="16" name="Rectangle 15">
+            <a:extLst>
+              <a:ext uri="{FF2B5EF4-FFF2-40B4-BE49-F238E27FC236}">
+                <a16:creationId xmlns:a16="http://schemas.microsoft.com/office/drawing/2014/main" id="{A8D57A06-A426-446D-B02C-A2DC6B62E45E}"/>
+              </a:ext>
+              <a:ext uri="{C183D7F6-B498-43B3-948B-1728B52AA6E4}">
+                <adec:decorative xmlns:adec="http://schemas.microsoft.com/office/drawing/2017/decorative" val="1"/>
+              </a:ext>
+            </a:extLst>
+          </p:cNvPr>
+          <p:cNvSpPr>
+            <a:spLocks noGrp="1" noRot="1" noChangeAspect="1" noMove="1" noResize="1" noEditPoints="1" noAdjustHandles="1" noChangeArrowheads="1" noChangeShapeType="1" noTextEdit="1"/>
+          </p:cNvSpPr>
+          <p:nvPr>
+            <p:extLst>
+              <p:ext uri="{386F3935-93C4-4BCD-93E2-E3B085C9AB24}">
+                <p16:designElem xmlns:p16="http://schemas.microsoft.com/office/powerpoint/2015/main" val="1"/>
+              </p:ext>
+            </p:extLst>
+          </p:nvPr>
+        </p:nvSpPr>
+        <p:spPr>
+          <a:xfrm rot="16200000" flipH="1">
+            <a:off x="3649491" y="-1685840"/>
+            <a:ext cx="4894564" cy="12193546"/>
+          </a:xfrm>
+          <a:prstGeom prst="rect">
+            <a:avLst/>
+          </a:prstGeom>
+          <a:gradFill>
+            <a:gsLst>
+              <a:gs pos="0">
+                <a:schemeClr val="accent5">
+                  <a:lumMod val="60000"/>
+                  <a:lumOff val="40000"/>
+                  <a:alpha val="0"/>
+                </a:schemeClr>
+              </a:gs>
+              <a:gs pos="100000">
+                <a:srgbClr val="000000">
+                  <a:alpha val="46000"/>
+                </a:srgbClr>
+              </a:gs>
+            </a:gsLst>
+            <a:lin ang="1200000" scaled="0"/>
+          </a:gradFill>
+          <a:ln>
+            <a:noFill/>
+          </a:ln>
+        </p:spPr>
+        <p:style>
+          <a:lnRef idx="2">
+            <a:schemeClr val="accent1">
+              <a:shade val="50000"/>
+            </a:schemeClr>
+          </a:lnRef>
+          <a:fillRef idx="1">
+            <a:schemeClr val="accent1"/>
+          </a:fillRef>
+          <a:effectRef idx="0">
+            <a:schemeClr val="accent1"/>
+          </a:effectRef>
+          <a:fontRef idx="minor">
+            <a:schemeClr val="lt1"/>
+          </a:fontRef>
+        </p:style>
+        <p:txBody>
+          <a:bodyPr rtlCol="0" anchor="ctr"/>
+          <a:lstStyle/>
+          <a:p>
+            <a:pPr algn="ctr"/>
+            <a:endParaRPr lang="en-US"/>
+          </a:p>
+        </p:txBody>
+      </p:sp>
+      <p:sp>
+        <p:nvSpPr>
+          <p:cNvPr id="2" name="TextBox 1">
+            <a:extLst>
+              <a:ext uri="{FF2B5EF4-FFF2-40B4-BE49-F238E27FC236}">
+                <a16:creationId xmlns:a16="http://schemas.microsoft.com/office/drawing/2014/main" id="{58F2584D-F505-4BEE-989E-AAB989B78ACE}"/>
+              </a:ext>
+            </a:extLst>
+          </p:cNvPr>
+          <p:cNvSpPr txBox="1"/>
+          <p:nvPr/>
+        </p:nvSpPr>
+        <p:spPr>
+          <a:xfrm>
             <a:off x="4671847" y="2501265"/>
             <a:ext cx="5958038" cy="1323439"/>
           </a:xfrm>
@@ -18239,7 +18683,7 @@
 </p:sld>
 </file>
 
-<file path=ppt/slides/slide18.xml><?xml version="1.0" encoding="utf-8"?>
+<file path=ppt/slides/slide19.xml><?xml version="1.0" encoding="utf-8"?>
 <p:sld xmlns:a="http://schemas.openxmlformats.org/drawingml/2006/main" xmlns:r="http://schemas.openxmlformats.org/officeDocument/2006/relationships" xmlns:p="http://schemas.openxmlformats.org/presentationml/2006/main">
   <p:cSld>
     <p:bg>
@@ -22167,8 +22611,8 @@
         </p:blipFill>
         <p:spPr>
           <a:xfrm>
-            <a:off x="10438410" y="253644"/>
-            <a:ext cx="1753590" cy="2137339"/>
+            <a:off x="7856627" y="180806"/>
+            <a:ext cx="1622761" cy="1977880"/>
           </a:xfrm>
           <a:prstGeom prst="rect">
             <a:avLst/>
@@ -22540,8 +22984,8 @@
         </p:blipFill>
         <p:spPr>
           <a:xfrm>
-            <a:off x="76999" y="677288"/>
-            <a:ext cx="11276801" cy="5799712"/>
+            <a:off x="406876" y="676432"/>
+            <a:ext cx="10607241" cy="5654719"/>
           </a:xfrm>
           <a:prstGeom prst="rect">
             <a:avLst/>

</xml_diff>

<commit_message>
committing the final version of the power point
</commit_message>
<xml_diff>
--- a/Portfolio_Diversifier.pptx
+++ b/Portfolio_Diversifier.pptx
@@ -13592,6 +13592,83 @@
           </a:p>
         </p:txBody>
       </p:sp>
+      <p:sp>
+        <p:nvSpPr>
+          <p:cNvPr id="11" name="TextBox 10">
+            <a:extLst>
+              <a:ext uri="{FF2B5EF4-FFF2-40B4-BE49-F238E27FC236}">
+                <a16:creationId xmlns:a16="http://schemas.microsoft.com/office/drawing/2014/main" id="{FA3E2750-6CDE-41D8-84F2-533A2633AC5A}"/>
+              </a:ext>
+            </a:extLst>
+          </p:cNvPr>
+          <p:cNvSpPr txBox="1"/>
+          <p:nvPr/>
+        </p:nvSpPr>
+        <p:spPr>
+          <a:xfrm>
+            <a:off x="5768644" y="5119480"/>
+            <a:ext cx="1333500" cy="646331"/>
+          </a:xfrm>
+          <a:prstGeom prst="rect">
+            <a:avLst/>
+          </a:prstGeom>
+          <a:noFill/>
+        </p:spPr>
+        <p:txBody>
+          <a:bodyPr wrap="square" rtlCol="0">
+            <a:spAutoFit/>
+          </a:bodyPr>
+          <a:lstStyle/>
+          <a:p>
+            <a:r>
+              <a:rPr lang="en-US" dirty="0"/>
+              <a:t>Clarendon Heights</a:t>
+            </a:r>
+          </a:p>
+        </p:txBody>
+      </p:sp>
+      <p:sp>
+        <p:nvSpPr>
+          <p:cNvPr id="13" name="TextBox 12">
+            <a:extLst>
+              <a:ext uri="{FF2B5EF4-FFF2-40B4-BE49-F238E27FC236}">
+                <a16:creationId xmlns:a16="http://schemas.microsoft.com/office/drawing/2014/main" id="{86BDC484-B8B0-48C9-A627-D0B35A198050}"/>
+              </a:ext>
+            </a:extLst>
+          </p:cNvPr>
+          <p:cNvSpPr txBox="1"/>
+          <p:nvPr/>
+        </p:nvSpPr>
+        <p:spPr>
+          <a:xfrm>
+            <a:off x="6095617" y="4177396"/>
+            <a:ext cx="1333500" cy="646331"/>
+          </a:xfrm>
+          <a:prstGeom prst="rect">
+            <a:avLst/>
+          </a:prstGeom>
+          <a:noFill/>
+        </p:spPr>
+        <p:txBody>
+          <a:bodyPr wrap="square" rtlCol="0">
+            <a:spAutoFit/>
+          </a:bodyPr>
+          <a:lstStyle/>
+          <a:p>
+            <a:r>
+              <a:rPr lang="en-US" b="0" i="0" dirty="0">
+                <a:solidFill>
+                  <a:srgbClr val="1D1C1D"/>
+                </a:solidFill>
+                <a:effectLst/>
+                <a:latin typeface="Slack-Lato"/>
+              </a:rPr>
+              <a:t>Buena Vista Park</a:t>
+            </a:r>
+            <a:endParaRPr lang="en-US" dirty="0"/>
+          </a:p>
+        </p:txBody>
+      </p:sp>
     </p:spTree>
     <p:extLst>
       <p:ext uri="{BB962C8B-B14F-4D97-AF65-F5344CB8AC3E}">
@@ -13749,42 +13826,6 @@
           </a:p>
         </p:txBody>
       </p:sp>
-      <p:pic>
-        <p:nvPicPr>
-          <p:cNvPr id="7" name="Picture 6" descr="Diagram&#10;&#10;Description automatically generated">
-            <a:extLst>
-              <a:ext uri="{FF2B5EF4-FFF2-40B4-BE49-F238E27FC236}">
-                <a16:creationId xmlns:a16="http://schemas.microsoft.com/office/drawing/2014/main" id="{288D4895-430B-4280-80C9-7E9841F3B1AC}"/>
-              </a:ext>
-            </a:extLst>
-          </p:cNvPr>
-          <p:cNvPicPr>
-            <a:picLocks noChangeAspect="1"/>
-          </p:cNvPicPr>
-          <p:nvPr/>
-        </p:nvPicPr>
-        <p:blipFill>
-          <a:blip r:embed="rId2">
-            <a:extLst>
-              <a:ext uri="{28A0092B-C50C-407E-A947-70E740481C1C}">
-                <a14:useLocalDpi xmlns:a14="http://schemas.microsoft.com/office/drawing/2010/main" val="0"/>
-              </a:ext>
-            </a:extLst>
-          </a:blip>
-          <a:stretch>
-            <a:fillRect/>
-          </a:stretch>
-        </p:blipFill>
-        <p:spPr>
-          <a:xfrm>
-            <a:off x="4321907" y="271263"/>
-            <a:ext cx="7307138" cy="6315474"/>
-          </a:xfrm>
-          <a:prstGeom prst="rect">
-            <a:avLst/>
-          </a:prstGeom>
-        </p:spPr>
-      </p:pic>
       <p:sp>
         <p:nvSpPr>
           <p:cNvPr id="5" name="AutoShape 4">
@@ -13830,6 +13871,42 @@
           </a:p>
         </p:txBody>
       </p:sp>
+      <p:pic>
+        <p:nvPicPr>
+          <p:cNvPr id="4" name="Picture 3" descr="Diagram&#10;&#10;Description automatically generated">
+            <a:extLst>
+              <a:ext uri="{FF2B5EF4-FFF2-40B4-BE49-F238E27FC236}">
+                <a16:creationId xmlns:a16="http://schemas.microsoft.com/office/drawing/2014/main" id="{ECB0C1E0-9DD3-4697-9C7F-639604672428}"/>
+              </a:ext>
+            </a:extLst>
+          </p:cNvPr>
+          <p:cNvPicPr>
+            <a:picLocks noChangeAspect="1"/>
+          </p:cNvPicPr>
+          <p:nvPr/>
+        </p:nvPicPr>
+        <p:blipFill>
+          <a:blip r:embed="rId2">
+            <a:extLst>
+              <a:ext uri="{28A0092B-C50C-407E-A947-70E740481C1C}">
+                <a14:useLocalDpi xmlns:a14="http://schemas.microsoft.com/office/drawing/2010/main" val="0"/>
+              </a:ext>
+            </a:extLst>
+          </a:blip>
+          <a:stretch>
+            <a:fillRect/>
+          </a:stretch>
+        </p:blipFill>
+        <p:spPr>
+          <a:xfrm>
+            <a:off x="4663945" y="76200"/>
+            <a:ext cx="6083560" cy="6858000"/>
+          </a:xfrm>
+          <a:prstGeom prst="rect">
+            <a:avLst/>
+          </a:prstGeom>
+        </p:spPr>
+      </p:pic>
     </p:spTree>
     <p:extLst>
       <p:ext uri="{BB962C8B-B14F-4D97-AF65-F5344CB8AC3E}">
@@ -18183,13 +18260,13 @@
         </p:nvSpPr>
         <p:spPr>
           <a:xfrm>
-            <a:off x="696528" y="1253117"/>
-            <a:ext cx="10515600" cy="4351338"/>
+            <a:off x="191703" y="1262641"/>
+            <a:ext cx="10515600" cy="5261984"/>
           </a:xfrm>
         </p:spPr>
         <p:txBody>
           <a:bodyPr>
-            <a:normAutofit fontScale="92500" lnSpcReduction="20000"/>
+            <a:normAutofit fontScale="92500" lnSpcReduction="10000"/>
           </a:bodyPr>
           <a:lstStyle/>
           <a:p>
@@ -18289,7 +18366,17 @@
                   <a:schemeClr val="bg1"/>
                 </a:solidFill>
               </a:rPr>
-              <a:t>Add Treynor, Information ratio and other diversification metrics for comparison                                       </a:t>
+              <a:t>Add Treynor, Information ratio and other diversification metrics for comparison</a:t>
+            </a:r>
+          </a:p>
+          <a:p>
+            <a:r>
+              <a:rPr lang="en-US" dirty="0">
+                <a:solidFill>
+                  <a:schemeClr val="bg1"/>
+                </a:solidFill>
+              </a:rPr>
+              <a:t>Explore Long Volatility and other funds as diversifiers                                       </a:t>
             </a:r>
           </a:p>
         </p:txBody>
@@ -19182,7 +19269,7 @@
                   <a:schemeClr val="bg1"/>
                 </a:solidFill>
               </a:rPr>
-              <a:t>Questionary                                                          </a:t>
+              <a:t>Monte Carlo                                                  </a:t>
             </a:r>
           </a:p>
         </p:txBody>
@@ -19425,25 +19512,7 @@
                   <a:schemeClr val="bg1"/>
                 </a:solidFill>
               </a:rPr>
-              <a:t>Pandas</a:t>
-            </a:r>
-          </a:p>
-          <a:p>
-            <a:r>
-              <a:rPr lang="en-US" dirty="0" err="1">
-                <a:solidFill>
-                  <a:schemeClr val="bg1"/>
-                </a:solidFill>
-              </a:rPr>
-              <a:t>Yfinance</a:t>
-            </a:r>
-            <a:r>
-              <a:rPr lang="en-US" dirty="0">
-                <a:solidFill>
-                  <a:schemeClr val="bg1"/>
-                </a:solidFill>
-              </a:rPr>
-              <a:t>                                            </a:t>
+              <a:t>Pandas                                          </a:t>
             </a:r>
           </a:p>
           <a:p>
@@ -19463,7 +19532,7 @@
                   <a:schemeClr val="bg1"/>
                 </a:solidFill>
               </a:rPr>
-              <a:t>Dash</a:t>
+              <a:t>External Style Sheets</a:t>
             </a:r>
           </a:p>
           <a:p>

</xml_diff>

<commit_message>
Updated the ppt and README
</commit_message>
<xml_diff>
--- a/Portfolio_Diversifier.pptx
+++ b/Portfolio_Diversifier.pptx
@@ -6,24 +6,25 @@
   </p:sldMasterIdLst>
   <p:sldIdLst>
     <p:sldId id="256" r:id="rId2"/>
-    <p:sldId id="274" r:id="rId3"/>
-    <p:sldId id="270" r:id="rId4"/>
-    <p:sldId id="275" r:id="rId5"/>
-    <p:sldId id="258" r:id="rId6"/>
-    <p:sldId id="257" r:id="rId7"/>
-    <p:sldId id="286" r:id="rId8"/>
-    <p:sldId id="285" r:id="rId9"/>
-    <p:sldId id="268" r:id="rId10"/>
-    <p:sldId id="269" r:id="rId11"/>
-    <p:sldId id="289" r:id="rId12"/>
-    <p:sldId id="273" r:id="rId13"/>
-    <p:sldId id="287" r:id="rId14"/>
-    <p:sldId id="288" r:id="rId15"/>
-    <p:sldId id="284" r:id="rId16"/>
-    <p:sldId id="290" r:id="rId17"/>
-    <p:sldId id="294" r:id="rId18"/>
-    <p:sldId id="292" r:id="rId19"/>
-    <p:sldId id="293" r:id="rId20"/>
+    <p:sldId id="296" r:id="rId3"/>
+    <p:sldId id="274" r:id="rId4"/>
+    <p:sldId id="270" r:id="rId5"/>
+    <p:sldId id="275" r:id="rId6"/>
+    <p:sldId id="258" r:id="rId7"/>
+    <p:sldId id="257" r:id="rId8"/>
+    <p:sldId id="286" r:id="rId9"/>
+    <p:sldId id="285" r:id="rId10"/>
+    <p:sldId id="268" r:id="rId11"/>
+    <p:sldId id="269" r:id="rId12"/>
+    <p:sldId id="289" r:id="rId13"/>
+    <p:sldId id="273" r:id="rId14"/>
+    <p:sldId id="287" r:id="rId15"/>
+    <p:sldId id="288" r:id="rId16"/>
+    <p:sldId id="284" r:id="rId17"/>
+    <p:sldId id="290" r:id="rId18"/>
+    <p:sldId id="294" r:id="rId19"/>
+    <p:sldId id="292" r:id="rId20"/>
+    <p:sldId id="293" r:id="rId21"/>
   </p:sldIdLst>
   <p:sldSz cx="12192000" cy="6858000"/>
   <p:notesSz cx="6858000" cy="9144000"/>
@@ -2131,7 +2132,7 @@
           </a:r>
           <a:r>
             <a:rPr lang="en-US" dirty="0"/>
-            <a:t>      20+ Year Treasury bond ETF</a:t>
+            <a:t>      20+ Year Treasury bond ETF (WARP)</a:t>
           </a:r>
         </a:p>
       </dgm:t>
@@ -2167,7 +2168,7 @@
         <a:p>
           <a:r>
             <a:rPr lang="en-US" dirty="0"/>
-            <a:t>shy    1-3 Year Treasury bond ETF</a:t>
+            <a:t>shy    1-3 Year Treasury bond ETF (Sharpe)</a:t>
           </a:r>
         </a:p>
       </dgm:t>
@@ -2207,7 +2208,7 @@
           </a:r>
           <a:r>
             <a:rPr lang="en-US" dirty="0"/>
-            <a:t>     Gold ETF</a:t>
+            <a:t>     Gold ETF (WARP)</a:t>
           </a:r>
         </a:p>
       </dgm:t>
@@ -2970,7 +2971,7 @@
           </a:r>
           <a:r>
             <a:rPr lang="en-US" sz="4200" kern="1200" dirty="0"/>
-            <a:t>      20+ Year Treasury bond ETF</a:t>
+            <a:t>      20+ Year Treasury bond ETF (WARP)</a:t>
           </a:r>
         </a:p>
       </dsp:txBody>
@@ -3069,7 +3070,7 @@
           </a:pPr>
           <a:r>
             <a:rPr lang="en-US" sz="4200" kern="1200" dirty="0"/>
-            <a:t>shy    1-3 Year Treasury bond ETF</a:t>
+            <a:t>shy    1-3 Year Treasury bond ETF (Sharpe)</a:t>
           </a:r>
         </a:p>
       </dsp:txBody>
@@ -3172,7 +3173,7 @@
           </a:r>
           <a:r>
             <a:rPr lang="en-US" sz="4200" kern="1200" dirty="0"/>
-            <a:t>     Gold ETF</a:t>
+            <a:t>     Gold ETF (WARP)</a:t>
           </a:r>
         </a:p>
       </dsp:txBody>
@@ -5734,7 +5735,7 @@
           <a:p>
             <a:fld id="{D5631127-A76B-4A35-A5FD-59E27004ABB4}" type="datetimeFigureOut">
               <a:rPr lang="en-US" smtClean="0"/>
-              <a:t>8/20/2021</a:t>
+              <a:t>8/22/2021</a:t>
             </a:fld>
             <a:endParaRPr lang="en-US"/>
           </a:p>
@@ -5932,7 +5933,7 @@
           <a:p>
             <a:fld id="{D5631127-A76B-4A35-A5FD-59E27004ABB4}" type="datetimeFigureOut">
               <a:rPr lang="en-US" smtClean="0"/>
-              <a:t>8/20/2021</a:t>
+              <a:t>8/22/2021</a:t>
             </a:fld>
             <a:endParaRPr lang="en-US"/>
           </a:p>
@@ -6140,7 +6141,7 @@
           <a:p>
             <a:fld id="{D5631127-A76B-4A35-A5FD-59E27004ABB4}" type="datetimeFigureOut">
               <a:rPr lang="en-US" smtClean="0"/>
-              <a:t>8/20/2021</a:t>
+              <a:t>8/22/2021</a:t>
             </a:fld>
             <a:endParaRPr lang="en-US"/>
           </a:p>
@@ -6338,7 +6339,7 @@
           <a:p>
             <a:fld id="{D5631127-A76B-4A35-A5FD-59E27004ABB4}" type="datetimeFigureOut">
               <a:rPr lang="en-US" smtClean="0"/>
-              <a:t>8/20/2021</a:t>
+              <a:t>8/22/2021</a:t>
             </a:fld>
             <a:endParaRPr lang="en-US"/>
           </a:p>
@@ -6613,7 +6614,7 @@
           <a:p>
             <a:fld id="{D5631127-A76B-4A35-A5FD-59E27004ABB4}" type="datetimeFigureOut">
               <a:rPr lang="en-US" smtClean="0"/>
-              <a:t>8/20/2021</a:t>
+              <a:t>8/22/2021</a:t>
             </a:fld>
             <a:endParaRPr lang="en-US"/>
           </a:p>
@@ -6878,7 +6879,7 @@
           <a:p>
             <a:fld id="{D5631127-A76B-4A35-A5FD-59E27004ABB4}" type="datetimeFigureOut">
               <a:rPr lang="en-US" smtClean="0"/>
-              <a:t>8/20/2021</a:t>
+              <a:t>8/22/2021</a:t>
             </a:fld>
             <a:endParaRPr lang="en-US"/>
           </a:p>
@@ -7290,7 +7291,7 @@
           <a:p>
             <a:fld id="{D5631127-A76B-4A35-A5FD-59E27004ABB4}" type="datetimeFigureOut">
               <a:rPr lang="en-US" smtClean="0"/>
-              <a:t>8/20/2021</a:t>
+              <a:t>8/22/2021</a:t>
             </a:fld>
             <a:endParaRPr lang="en-US"/>
           </a:p>
@@ -7431,7 +7432,7 @@
           <a:p>
             <a:fld id="{D5631127-A76B-4A35-A5FD-59E27004ABB4}" type="datetimeFigureOut">
               <a:rPr lang="en-US" smtClean="0"/>
-              <a:t>8/20/2021</a:t>
+              <a:t>8/22/2021</a:t>
             </a:fld>
             <a:endParaRPr lang="en-US"/>
           </a:p>
@@ -7544,7 +7545,7 @@
           <a:p>
             <a:fld id="{D5631127-A76B-4A35-A5FD-59E27004ABB4}" type="datetimeFigureOut">
               <a:rPr lang="en-US" smtClean="0"/>
-              <a:t>8/20/2021</a:t>
+              <a:t>8/22/2021</a:t>
             </a:fld>
             <a:endParaRPr lang="en-US"/>
           </a:p>
@@ -7855,7 +7856,7 @@
           <a:p>
             <a:fld id="{D5631127-A76B-4A35-A5FD-59E27004ABB4}" type="datetimeFigureOut">
               <a:rPr lang="en-US" smtClean="0"/>
-              <a:t>8/20/2021</a:t>
+              <a:t>8/22/2021</a:t>
             </a:fld>
             <a:endParaRPr lang="en-US"/>
           </a:p>
@@ -8143,7 +8144,7 @@
           <a:p>
             <a:fld id="{D5631127-A76B-4A35-A5FD-59E27004ABB4}" type="datetimeFigureOut">
               <a:rPr lang="en-US" smtClean="0"/>
-              <a:t>8/20/2021</a:t>
+              <a:t>8/22/2021</a:t>
             </a:fld>
             <a:endParaRPr lang="en-US"/>
           </a:p>
@@ -8384,7 +8385,7 @@
           <a:p>
             <a:fld id="{D5631127-A76B-4A35-A5FD-59E27004ABB4}" type="datetimeFigureOut">
               <a:rPr lang="en-US" smtClean="0"/>
-              <a:t>8/20/2021</a:t>
+              <a:t>8/22/2021</a:t>
             </a:fld>
             <a:endParaRPr lang="en-US"/>
           </a:p>
@@ -9706,6 +9707,430 @@
       </p:grpSpPr>
       <p:sp useBgFill="1">
         <p:nvSpPr>
+          <p:cNvPr id="10" name="Rectangle 9">
+            <a:extLst>
+              <a:ext uri="{FF2B5EF4-FFF2-40B4-BE49-F238E27FC236}">
+                <a16:creationId xmlns:a16="http://schemas.microsoft.com/office/drawing/2014/main" id="{AB8C311F-7253-4AED-9701-7FC0708C41C7}"/>
+              </a:ext>
+              <a:ext uri="{C183D7F6-B498-43B3-948B-1728B52AA6E4}">
+                <adec:decorative xmlns:adec="http://schemas.microsoft.com/office/drawing/2017/decorative" val="1"/>
+              </a:ext>
+            </a:extLst>
+          </p:cNvPr>
+          <p:cNvSpPr>
+            <a:spLocks noGrp="1" noRot="1" noChangeAspect="1" noMove="1" noResize="1" noEditPoints="1" noAdjustHandles="1" noChangeArrowheads="1" noChangeShapeType="1" noTextEdit="1"/>
+          </p:cNvSpPr>
+          <p:nvPr>
+            <p:extLst>
+              <p:ext uri="{386F3935-93C4-4BCD-93E2-E3B085C9AB24}">
+                <p16:designElem xmlns:p16="http://schemas.microsoft.com/office/powerpoint/2015/main" val="1"/>
+              </p:ext>
+            </p:extLst>
+          </p:nvPr>
+        </p:nvSpPr>
+        <p:spPr>
+          <a:xfrm>
+            <a:off x="0" y="0"/>
+            <a:ext cx="12192000" cy="6858000"/>
+          </a:xfrm>
+          <a:prstGeom prst="rect">
+            <a:avLst/>
+          </a:prstGeom>
+          <a:ln w="12700" cap="flat" cmpd="sng" algn="ctr">
+            <a:noFill/>
+            <a:prstDash val="solid"/>
+            <a:miter lim="800000"/>
+          </a:ln>
+          <a:effectLst/>
+          <a:extLst>
+            <a:ext uri="{91240B29-F687-4F45-9708-019B960494DF}">
+              <a14:hiddenLine xmlns:a14="http://schemas.microsoft.com/office/drawing/2010/main" w="12700" cap="flat" cmpd="sng" algn="ctr">
+                <a:solidFill>
+                  <a:schemeClr val="accent1">
+                    <a:shade val="50000"/>
+                  </a:schemeClr>
+                </a:solidFill>
+                <a:prstDash val="solid"/>
+                <a:miter lim="800000"/>
+              </a14:hiddenLine>
+            </a:ext>
+          </a:extLst>
+        </p:spPr>
+        <p:style>
+          <a:lnRef idx="2">
+            <a:schemeClr val="accent1">
+              <a:shade val="50000"/>
+            </a:schemeClr>
+          </a:lnRef>
+          <a:fillRef idx="1">
+            <a:schemeClr val="accent1"/>
+          </a:fillRef>
+          <a:effectRef idx="0">
+            <a:schemeClr val="accent1"/>
+          </a:effectRef>
+          <a:fontRef idx="minor">
+            <a:schemeClr val="lt1"/>
+          </a:fontRef>
+        </p:style>
+        <p:txBody>
+          <a:bodyPr rtlCol="0" anchor="ctr"/>
+          <a:lstStyle/>
+          <a:p>
+            <a:pPr algn="ctr"/>
+            <a:endParaRPr lang="en-US"/>
+          </a:p>
+        </p:txBody>
+      </p:sp>
+      <p:sp>
+        <p:nvSpPr>
+          <p:cNvPr id="12" name="Rectangle 11">
+            <a:extLst>
+              <a:ext uri="{FF2B5EF4-FFF2-40B4-BE49-F238E27FC236}">
+                <a16:creationId xmlns:a16="http://schemas.microsoft.com/office/drawing/2014/main" id="{E2384209-CB15-4CDF-9D31-C44FD9A3F20D}"/>
+              </a:ext>
+              <a:ext uri="{C183D7F6-B498-43B3-948B-1728B52AA6E4}">
+                <adec:decorative xmlns:adec="http://schemas.microsoft.com/office/drawing/2017/decorative" val="1"/>
+              </a:ext>
+            </a:extLst>
+          </p:cNvPr>
+          <p:cNvSpPr>
+            <a:spLocks noGrp="1" noRot="1" noChangeAspect="1" noMove="1" noResize="1" noEditPoints="1" noAdjustHandles="1" noChangeArrowheads="1" noChangeShapeType="1" noTextEdit="1"/>
+          </p:cNvSpPr>
+          <p:nvPr>
+            <p:extLst>
+              <p:ext uri="{386F3935-93C4-4BCD-93E2-E3B085C9AB24}">
+                <p16:designElem xmlns:p16="http://schemas.microsoft.com/office/powerpoint/2015/main" val="1"/>
+              </p:ext>
+            </p:extLst>
+          </p:nvPr>
+        </p:nvSpPr>
+        <p:spPr>
+          <a:xfrm rot="16200000" flipH="1">
+            <a:off x="2666617" y="-2666188"/>
+            <a:ext cx="6858000" cy="12191233"/>
+          </a:xfrm>
+          <a:prstGeom prst="rect">
+            <a:avLst/>
+          </a:prstGeom>
+          <a:gradFill>
+            <a:gsLst>
+              <a:gs pos="8000">
+                <a:schemeClr val="accent1"/>
+              </a:gs>
+              <a:gs pos="100000">
+                <a:schemeClr val="accent1">
+                  <a:lumMod val="50000"/>
+                </a:schemeClr>
+              </a:gs>
+            </a:gsLst>
+            <a:lin ang="12000000" scaled="0"/>
+          </a:gradFill>
+          <a:ln>
+            <a:noFill/>
+          </a:ln>
+        </p:spPr>
+        <p:style>
+          <a:lnRef idx="2">
+            <a:schemeClr val="accent1">
+              <a:shade val="50000"/>
+            </a:schemeClr>
+          </a:lnRef>
+          <a:fillRef idx="1">
+            <a:schemeClr val="accent1"/>
+          </a:fillRef>
+          <a:effectRef idx="0">
+            <a:schemeClr val="accent1"/>
+          </a:effectRef>
+          <a:fontRef idx="minor">
+            <a:schemeClr val="lt1"/>
+          </a:fontRef>
+        </p:style>
+        <p:txBody>
+          <a:bodyPr rtlCol="0" anchor="ctr"/>
+          <a:lstStyle/>
+          <a:p>
+            <a:pPr algn="ctr"/>
+            <a:endParaRPr lang="en-US"/>
+          </a:p>
+        </p:txBody>
+      </p:sp>
+      <p:sp>
+        <p:nvSpPr>
+          <p:cNvPr id="14" name="Rectangle 13">
+            <a:extLst>
+              <a:ext uri="{FF2B5EF4-FFF2-40B4-BE49-F238E27FC236}">
+                <a16:creationId xmlns:a16="http://schemas.microsoft.com/office/drawing/2014/main" id="{2633B3B5-CC90-43F0-8714-D31D1F3F0209}"/>
+              </a:ext>
+              <a:ext uri="{C183D7F6-B498-43B3-948B-1728B52AA6E4}">
+                <adec:decorative xmlns:adec="http://schemas.microsoft.com/office/drawing/2017/decorative" val="1"/>
+              </a:ext>
+            </a:extLst>
+          </p:cNvPr>
+          <p:cNvSpPr>
+            <a:spLocks noGrp="1" noRot="1" noChangeAspect="1" noMove="1" noResize="1" noEditPoints="1" noAdjustHandles="1" noChangeArrowheads="1" noChangeShapeType="1" noTextEdit="1"/>
+          </p:cNvSpPr>
+          <p:nvPr>
+            <p:extLst>
+              <p:ext uri="{386F3935-93C4-4BCD-93E2-E3B085C9AB24}">
+                <p16:designElem xmlns:p16="http://schemas.microsoft.com/office/powerpoint/2015/main" val="1"/>
+              </p:ext>
+            </p:extLst>
+          </p:nvPr>
+        </p:nvSpPr>
+        <p:spPr>
+          <a:xfrm rot="10800000" flipH="1">
+            <a:off x="-2311" y="0"/>
+            <a:ext cx="9070846" cy="6857572"/>
+          </a:xfrm>
+          <a:prstGeom prst="rect">
+            <a:avLst/>
+          </a:prstGeom>
+          <a:gradFill>
+            <a:gsLst>
+              <a:gs pos="8000">
+                <a:srgbClr val="000000">
+                  <a:alpha val="52000"/>
+                </a:srgbClr>
+              </a:gs>
+              <a:gs pos="100000">
+                <a:schemeClr val="accent1"/>
+              </a:gs>
+            </a:gsLst>
+            <a:lin ang="4800000" scaled="0"/>
+          </a:gradFill>
+          <a:ln>
+            <a:noFill/>
+          </a:ln>
+        </p:spPr>
+        <p:style>
+          <a:lnRef idx="2">
+            <a:schemeClr val="accent1">
+              <a:shade val="50000"/>
+            </a:schemeClr>
+          </a:lnRef>
+          <a:fillRef idx="1">
+            <a:schemeClr val="accent1"/>
+          </a:fillRef>
+          <a:effectRef idx="0">
+            <a:schemeClr val="accent1"/>
+          </a:effectRef>
+          <a:fontRef idx="minor">
+            <a:schemeClr val="lt1"/>
+          </a:fontRef>
+        </p:style>
+        <p:txBody>
+          <a:bodyPr rtlCol="0" anchor="ctr"/>
+          <a:lstStyle/>
+          <a:p>
+            <a:pPr algn="ctr"/>
+            <a:endParaRPr lang="en-US"/>
+          </a:p>
+        </p:txBody>
+      </p:sp>
+      <p:sp>
+        <p:nvSpPr>
+          <p:cNvPr id="16" name="Rectangle 15">
+            <a:extLst>
+              <a:ext uri="{FF2B5EF4-FFF2-40B4-BE49-F238E27FC236}">
+                <a16:creationId xmlns:a16="http://schemas.microsoft.com/office/drawing/2014/main" id="{A8D57A06-A426-446D-B02C-A2DC6B62E45E}"/>
+              </a:ext>
+              <a:ext uri="{C183D7F6-B498-43B3-948B-1728B52AA6E4}">
+                <adec:decorative xmlns:adec="http://schemas.microsoft.com/office/drawing/2017/decorative" val="1"/>
+              </a:ext>
+            </a:extLst>
+          </p:cNvPr>
+          <p:cNvSpPr>
+            <a:spLocks noGrp="1" noRot="1" noChangeAspect="1" noMove="1" noResize="1" noEditPoints="1" noAdjustHandles="1" noChangeArrowheads="1" noChangeShapeType="1" noTextEdit="1"/>
+          </p:cNvSpPr>
+          <p:nvPr>
+            <p:extLst>
+              <p:ext uri="{386F3935-93C4-4BCD-93E2-E3B085C9AB24}">
+                <p16:designElem xmlns:p16="http://schemas.microsoft.com/office/powerpoint/2015/main" val="1"/>
+              </p:ext>
+            </p:extLst>
+          </p:nvPr>
+        </p:nvSpPr>
+        <p:spPr>
+          <a:xfrm rot="16200000" flipH="1">
+            <a:off x="3649491" y="-1685840"/>
+            <a:ext cx="4894564" cy="12193546"/>
+          </a:xfrm>
+          <a:prstGeom prst="rect">
+            <a:avLst/>
+          </a:prstGeom>
+          <a:gradFill>
+            <a:gsLst>
+              <a:gs pos="0">
+                <a:schemeClr val="accent5">
+                  <a:lumMod val="60000"/>
+                  <a:lumOff val="40000"/>
+                  <a:alpha val="0"/>
+                </a:schemeClr>
+              </a:gs>
+              <a:gs pos="100000">
+                <a:srgbClr val="000000">
+                  <a:alpha val="46000"/>
+                </a:srgbClr>
+              </a:gs>
+            </a:gsLst>
+            <a:lin ang="1200000" scaled="0"/>
+          </a:gradFill>
+          <a:ln>
+            <a:noFill/>
+          </a:ln>
+        </p:spPr>
+        <p:style>
+          <a:lnRef idx="2">
+            <a:schemeClr val="accent1">
+              <a:shade val="50000"/>
+            </a:schemeClr>
+          </a:lnRef>
+          <a:fillRef idx="1">
+            <a:schemeClr val="accent1"/>
+          </a:fillRef>
+          <a:effectRef idx="0">
+            <a:schemeClr val="accent1"/>
+          </a:effectRef>
+          <a:fontRef idx="minor">
+            <a:schemeClr val="lt1"/>
+          </a:fontRef>
+        </p:style>
+        <p:txBody>
+          <a:bodyPr rtlCol="0" anchor="ctr"/>
+          <a:lstStyle/>
+          <a:p>
+            <a:pPr algn="ctr"/>
+            <a:endParaRPr lang="en-US"/>
+          </a:p>
+        </p:txBody>
+      </p:sp>
+      <p:pic>
+        <p:nvPicPr>
+          <p:cNvPr id="3" name="Picture 2" descr="Chart&#10;&#10;Description automatically generated">
+            <a:extLst>
+              <a:ext uri="{FF2B5EF4-FFF2-40B4-BE49-F238E27FC236}">
+                <a16:creationId xmlns:a16="http://schemas.microsoft.com/office/drawing/2014/main" id="{8F7F74C1-635B-4556-B03A-F48C00F114F2}"/>
+              </a:ext>
+            </a:extLst>
+          </p:cNvPr>
+          <p:cNvPicPr>
+            <a:picLocks noChangeAspect="1"/>
+          </p:cNvPicPr>
+          <p:nvPr/>
+        </p:nvPicPr>
+        <p:blipFill>
+          <a:blip r:embed="rId2">
+            <a:extLst>
+              <a:ext uri="{28A0092B-C50C-407E-A947-70E740481C1C}">
+                <a14:useLocalDpi xmlns:a14="http://schemas.microsoft.com/office/drawing/2010/main" val="0"/>
+              </a:ext>
+            </a:extLst>
+          </a:blip>
+          <a:stretch>
+            <a:fillRect/>
+          </a:stretch>
+        </p:blipFill>
+        <p:spPr>
+          <a:xfrm>
+            <a:off x="406876" y="676432"/>
+            <a:ext cx="10607241" cy="5654719"/>
+          </a:xfrm>
+          <a:prstGeom prst="rect">
+            <a:avLst/>
+          </a:prstGeom>
+        </p:spPr>
+      </p:pic>
+      <p:sp>
+        <p:nvSpPr>
+          <p:cNvPr id="7" name="TextBox 6">
+            <a:extLst>
+              <a:ext uri="{FF2B5EF4-FFF2-40B4-BE49-F238E27FC236}">
+                <a16:creationId xmlns:a16="http://schemas.microsoft.com/office/drawing/2014/main" id="{0FC29528-E595-4DB8-84D7-1B26B4D6E593}"/>
+              </a:ext>
+            </a:extLst>
+          </p:cNvPr>
+          <p:cNvSpPr txBox="1"/>
+          <p:nvPr/>
+        </p:nvSpPr>
+        <p:spPr>
+          <a:xfrm>
+            <a:off x="7778399" y="3392477"/>
+            <a:ext cx="3157086" cy="2031325"/>
+          </a:xfrm>
+          <a:prstGeom prst="rect">
+            <a:avLst/>
+          </a:prstGeom>
+          <a:noFill/>
+        </p:spPr>
+        <p:txBody>
+          <a:bodyPr wrap="square" rtlCol="0">
+            <a:spAutoFit/>
+          </a:bodyPr>
+          <a:lstStyle/>
+          <a:p>
+            <a:r>
+              <a:rPr lang="en-US" dirty="0"/>
+              <a:t>portfolio with </a:t>
+            </a:r>
+            <a:r>
+              <a:rPr lang="en-US" dirty="0" err="1"/>
+              <a:t>tlt</a:t>
+            </a:r>
+            <a:r>
+              <a:rPr lang="en-US" dirty="0"/>
+              <a:t> (WARP) and </a:t>
+            </a:r>
+            <a:r>
+              <a:rPr lang="en-US" dirty="0" err="1"/>
+              <a:t>gld</a:t>
+            </a:r>
+            <a:r>
+              <a:rPr lang="en-US" dirty="0"/>
+              <a:t> (WARP) as the diversifier performs better than the market and provide more downside protection and better recovery in the Pandemic than the portfolio with shy (Sharpe)</a:t>
+            </a:r>
+          </a:p>
+        </p:txBody>
+      </p:sp>
+    </p:spTree>
+    <p:extLst>
+      <p:ext uri="{BB962C8B-B14F-4D97-AF65-F5344CB8AC3E}">
+        <p14:creationId xmlns:p14="http://schemas.microsoft.com/office/powerpoint/2010/main" val="761059145"/>
+      </p:ext>
+    </p:extLst>
+  </p:cSld>
+  <p:clrMapOvr>
+    <a:masterClrMapping/>
+  </p:clrMapOvr>
+</p:sld>
+</file>
+
+<file path=ppt/slides/slide11.xml><?xml version="1.0" encoding="utf-8"?>
+<p:sld xmlns:a="http://schemas.openxmlformats.org/drawingml/2006/main" xmlns:r="http://schemas.openxmlformats.org/officeDocument/2006/relationships" xmlns:p="http://schemas.openxmlformats.org/presentationml/2006/main">
+  <p:cSld>
+    <p:bg>
+      <p:bgPr>
+        <a:solidFill>
+          <a:schemeClr val="bg1"/>
+        </a:solidFill>
+        <a:effectLst/>
+      </p:bgPr>
+    </p:bg>
+    <p:spTree>
+      <p:nvGrpSpPr>
+        <p:cNvPr id="1" name=""/>
+        <p:cNvGrpSpPr/>
+        <p:nvPr/>
+      </p:nvGrpSpPr>
+      <p:grpSpPr>
+        <a:xfrm>
+          <a:off x="0" y="0"/>
+          <a:ext cx="0" cy="0"/>
+          <a:chOff x="0" y="0"/>
+          <a:chExt cx="0" cy="0"/>
+        </a:xfrm>
+      </p:grpSpPr>
+      <p:sp useBgFill="1">
+        <p:nvSpPr>
           <p:cNvPr id="14" name="Rectangle 13">
             <a:extLst>
               <a:ext uri="{FF2B5EF4-FFF2-40B4-BE49-F238E27FC236}">
@@ -13000,10 +13425,6 @@
           <a:lstStyle/>
           <a:p>
             <a:r>
-              <a:rPr lang="en-US" sz="3200" dirty="0"/>
-              <a:t>Portfolio</a:t>
-            </a:r>
-            <a:r>
               <a:rPr lang="en-US" sz="3200" dirty="0">
                 <a:solidFill>
                   <a:schemeClr val="bg1"/>
@@ -13014,6 +13435,14 @@
             <a:r>
               <a:rPr lang="en-US" sz="3200" dirty="0"/>
               <a:t>consisting of 20% </a:t>
+            </a:r>
+            <a:r>
+              <a:rPr lang="en-US" sz="3200" dirty="0" err="1"/>
+              <a:t>tlt</a:t>
+            </a:r>
+            <a:r>
+              <a:rPr lang="en-US" sz="3200" dirty="0"/>
+              <a:t> (best diversifier </a:t>
             </a:r>
           </a:p>
           <a:p>
@@ -13052,8 +13481,8 @@
         </p:nvSpPr>
         <p:spPr>
           <a:xfrm>
-            <a:off x="2084225" y="141007"/>
-            <a:ext cx="7869925" cy="1569660"/>
+            <a:off x="602345" y="132416"/>
+            <a:ext cx="8741367" cy="1569660"/>
           </a:xfrm>
           <a:prstGeom prst="rect">
             <a:avLst/>
@@ -13072,25 +13501,17 @@
                   <a:schemeClr val="bg1"/>
                 </a:solidFill>
               </a:rPr>
-              <a:t>Forecasting of</a:t>
+              <a:t> Forecasting of portfolio</a:t>
             </a:r>
           </a:p>
           <a:p>
-            <a:r>
-              <a:rPr lang="en-US" sz="3200" dirty="0" err="1">
-                <a:solidFill>
-                  <a:schemeClr val="bg1"/>
-                </a:solidFill>
-              </a:rPr>
-              <a:t>tlt</a:t>
-            </a:r>
             <a:r>
               <a:rPr lang="en-US" sz="3200" dirty="0">
                 <a:solidFill>
                   <a:schemeClr val="bg1"/>
                 </a:solidFill>
               </a:rPr>
-              <a:t> (diversifier) </a:t>
+              <a:t>from historical analysis) </a:t>
             </a:r>
           </a:p>
           <a:p>
@@ -13100,7 +13521,7 @@
                   <a:schemeClr val="bg1"/>
                 </a:solidFill>
               </a:rPr>
-              <a:t>              using</a:t>
+              <a:t>                                using</a:t>
             </a:r>
           </a:p>
         </p:txBody>
@@ -13154,7 +13575,7 @@
 </p:sld>
 </file>
 
-<file path=ppt/slides/slide11.xml><?xml version="1.0" encoding="utf-8"?>
+<file path=ppt/slides/slide12.xml><?xml version="1.0" encoding="utf-8"?>
 <p:sld xmlns:a="http://schemas.openxmlformats.org/drawingml/2006/main" xmlns:r="http://schemas.openxmlformats.org/officeDocument/2006/relationships" xmlns:p="http://schemas.openxmlformats.org/presentationml/2006/main">
   <p:cSld>
     <p:bg>
@@ -13682,7 +14103,7 @@
 </p:sld>
 </file>
 
-<file path=ppt/slides/slide12.xml><?xml version="1.0" encoding="utf-8"?>
+<file path=ppt/slides/slide13.xml><?xml version="1.0" encoding="utf-8"?>
 <p:sld xmlns:a="http://schemas.openxmlformats.org/drawingml/2006/main" xmlns:r="http://schemas.openxmlformats.org/officeDocument/2006/relationships" xmlns:p="http://schemas.openxmlformats.org/presentationml/2006/main">
   <p:cSld>
     <p:bg>
@@ -13920,7 +14341,7 @@
 </p:sld>
 </file>
 
-<file path=ppt/slides/slide13.xml><?xml version="1.0" encoding="utf-8"?>
+<file path=ppt/slides/slide14.xml><?xml version="1.0" encoding="utf-8"?>
 <p:sld xmlns:a="http://schemas.openxmlformats.org/drawingml/2006/main" xmlns:r="http://schemas.openxmlformats.org/officeDocument/2006/relationships" xmlns:p="http://schemas.openxmlformats.org/presentationml/2006/main">
   <p:cSld>
     <p:bg>
@@ -14296,7 +14717,7 @@
 </p:sld>
 </file>
 
-<file path=ppt/slides/slide14.xml><?xml version="1.0" encoding="utf-8"?>
+<file path=ppt/slides/slide15.xml><?xml version="1.0" encoding="utf-8"?>
 <p:sld xmlns:a="http://schemas.openxmlformats.org/drawingml/2006/main" xmlns:r="http://schemas.openxmlformats.org/officeDocument/2006/relationships" xmlns:p="http://schemas.openxmlformats.org/presentationml/2006/main">
   <p:cSld>
     <p:bg>
@@ -14708,7 +15129,7 @@
 </p:sld>
 </file>
 
-<file path=ppt/slides/slide15.xml><?xml version="1.0" encoding="utf-8"?>
+<file path=ppt/slides/slide16.xml><?xml version="1.0" encoding="utf-8"?>
 <p:sld xmlns:a="http://schemas.openxmlformats.org/drawingml/2006/main" xmlns:r="http://schemas.openxmlformats.org/officeDocument/2006/relationships" xmlns:p="http://schemas.openxmlformats.org/presentationml/2006/main">
   <p:cSld>
     <p:bg>
@@ -17436,7 +17857,7 @@
 </p:sld>
 </file>
 
-<file path=ppt/slides/slide16.xml><?xml version="1.0" encoding="utf-8"?>
+<file path=ppt/slides/slide17.xml><?xml version="1.0" encoding="utf-8"?>
 <p:sld xmlns:a="http://schemas.openxmlformats.org/drawingml/2006/main" xmlns:r="http://schemas.openxmlformats.org/officeDocument/2006/relationships" xmlns:p="http://schemas.openxmlformats.org/presentationml/2006/main">
   <p:cSld>
     <p:bg>
@@ -17817,13 +18238,13 @@
         </p:nvSpPr>
         <p:spPr>
           <a:xfrm>
-            <a:off x="696528" y="1253117"/>
-            <a:ext cx="10515600" cy="4351338"/>
+            <a:off x="696527" y="1023688"/>
+            <a:ext cx="11152171" cy="5319360"/>
           </a:xfrm>
         </p:spPr>
         <p:txBody>
           <a:bodyPr>
-            <a:normAutofit/>
+            <a:normAutofit fontScale="92500" lnSpcReduction="10000"/>
           </a:bodyPr>
           <a:lstStyle/>
           <a:p>
@@ -17832,6 +18253,8 @@
                 <a:solidFill>
                   <a:schemeClr val="bg1"/>
                 </a:solidFill>
+                <a:latin typeface="Calibri" panose="020F0502020204030204" pitchFamily="34" charset="0"/>
+                <a:cs typeface="Calibri" panose="020F0502020204030204" pitchFamily="34" charset="0"/>
               </a:rPr>
               <a:t>tlt</a:t>
             </a:r>
@@ -17840,9 +18263,53 @@
                 <a:solidFill>
                   <a:schemeClr val="bg1"/>
                 </a:solidFill>
+                <a:latin typeface="Calibri" panose="020F0502020204030204" pitchFamily="34" charset="0"/>
+                <a:cs typeface="Calibri" panose="020F0502020204030204" pitchFamily="34" charset="0"/>
               </a:rPr>
-              <a:t> is the best diversifier</a:t>
+              <a:t> is the best diversifier out of the list of known diversifiers</a:t>
             </a:r>
+          </a:p>
+          <a:p>
+            <a:r>
+              <a:rPr lang="en-US" b="0" dirty="0">
+                <a:solidFill>
+                  <a:schemeClr val="bg1"/>
+                </a:solidFill>
+                <a:effectLst/>
+                <a:latin typeface="Calibri" panose="020F0502020204030204" pitchFamily="34" charset="0"/>
+                <a:cs typeface="Calibri" panose="020F0502020204030204" pitchFamily="34" charset="0"/>
+              </a:rPr>
+              <a:t>portfolio mixing 20% </a:t>
+            </a:r>
+            <a:r>
+              <a:rPr lang="en-US" b="0" dirty="0" err="1">
+                <a:solidFill>
+                  <a:schemeClr val="bg1"/>
+                </a:solidFill>
+                <a:effectLst/>
+                <a:latin typeface="Calibri" panose="020F0502020204030204" pitchFamily="34" charset="0"/>
+                <a:cs typeface="Calibri" panose="020F0502020204030204" pitchFamily="34" charset="0"/>
+              </a:rPr>
+              <a:t>tlt</a:t>
+            </a:r>
+            <a:r>
+              <a:rPr lang="en-US" b="0" dirty="0">
+                <a:solidFill>
+                  <a:schemeClr val="bg1"/>
+                </a:solidFill>
+                <a:effectLst/>
+                <a:latin typeface="Calibri" panose="020F0502020204030204" pitchFamily="34" charset="0"/>
+                <a:cs typeface="Calibri" panose="020F0502020204030204" pitchFamily="34" charset="0"/>
+              </a:rPr>
+              <a:t> (picked based on WARP) with 80% spy performs better  than portfolio mixing 20% shy (picked based on Sharpe) with 80% spy</a:t>
+            </a:r>
+            <a:endParaRPr lang="en-US" dirty="0">
+              <a:solidFill>
+                <a:schemeClr val="bg1"/>
+              </a:solidFill>
+              <a:latin typeface="Calibri" panose="020F0502020204030204" pitchFamily="34" charset="0"/>
+              <a:cs typeface="Calibri" panose="020F0502020204030204" pitchFamily="34" charset="0"/>
+            </a:endParaRPr>
           </a:p>
           <a:p>
             <a:r>
@@ -17850,6 +18317,8 @@
                 <a:solidFill>
                   <a:schemeClr val="bg1"/>
                 </a:solidFill>
+                <a:latin typeface="Calibri" panose="020F0502020204030204" pitchFamily="34" charset="0"/>
+                <a:cs typeface="Calibri" panose="020F0502020204030204" pitchFamily="34" charset="0"/>
               </a:rPr>
               <a:t>WARP allows us to easily identify a good diversifier and does not suffer from some of the flaws of common ratios such as Sharpe</a:t>
             </a:r>
@@ -17860,9 +18329,57 @@
                 <a:solidFill>
                   <a:schemeClr val="bg1"/>
                 </a:solidFill>
+                <a:latin typeface="Calibri" panose="020F0502020204030204" pitchFamily="34" charset="0"/>
+                <a:cs typeface="Calibri" panose="020F0502020204030204" pitchFamily="34" charset="0"/>
               </a:rPr>
-              <a:t>Diversifier identified by WARP allows us to perform better than the market in both the bull and bear periods.</a:t>
+              <a:t>Diversifier identified by WARP allows us to perform better than the market and the diversifiers identified using other ratios (such as Sharpe, etc.) in both the bull and bear periods.</a:t>
             </a:r>
+          </a:p>
+          <a:p>
+            <a:r>
+              <a:rPr lang="en-US" b="0" dirty="0">
+                <a:solidFill>
+                  <a:schemeClr val="bg1"/>
+                </a:solidFill>
+                <a:effectLst/>
+                <a:latin typeface="Calibri" panose="020F0502020204030204" pitchFamily="34" charset="0"/>
+                <a:cs typeface="Calibri" panose="020F0502020204030204" pitchFamily="34" charset="0"/>
+              </a:rPr>
+              <a:t>Sharpe is not a good way to identify tickers for diversification.</a:t>
+            </a:r>
+          </a:p>
+          <a:p>
+            <a:r>
+              <a:rPr lang="en-US" b="0" dirty="0">
+                <a:solidFill>
+                  <a:schemeClr val="bg1"/>
+                </a:solidFill>
+                <a:effectLst/>
+                <a:latin typeface="Calibri" panose="020F0502020204030204" pitchFamily="34" charset="0"/>
+                <a:cs typeface="Calibri" panose="020F0502020204030204" pitchFamily="34" charset="0"/>
+              </a:rPr>
+              <a:t>Buena Vista Park and Clarendon Heights in San Francisco are ideal initial neighborhoods to target customers for this application.</a:t>
+            </a:r>
+          </a:p>
+          <a:p>
+            <a:r>
+              <a:rPr lang="en-US" b="0" dirty="0">
+                <a:solidFill>
+                  <a:schemeClr val="bg1"/>
+                </a:solidFill>
+                <a:effectLst/>
+                <a:latin typeface="Calibri" panose="020F0502020204030204" pitchFamily="34" charset="0"/>
+                <a:cs typeface="Calibri" panose="020F0502020204030204" pitchFamily="34" charset="0"/>
+              </a:rPr>
+              <a:t>Questionary and Dash provide a seamless UI/Front end experience for  customers to easily navigate through their diversification requirements and provide a guided experience with recommendations.</a:t>
+            </a:r>
+          </a:p>
+          <a:p>
+            <a:endParaRPr lang="en-US" dirty="0">
+              <a:solidFill>
+                <a:schemeClr val="bg1"/>
+              </a:solidFill>
+            </a:endParaRPr>
           </a:p>
         </p:txBody>
       </p:sp>
@@ -17879,7 +18396,7 @@
 </p:sld>
 </file>
 
-<file path=ppt/slides/slide17.xml><?xml version="1.0" encoding="utf-8"?>
+<file path=ppt/slides/slide18.xml><?xml version="1.0" encoding="utf-8"?>
 <p:sld xmlns:a="http://schemas.openxmlformats.org/drawingml/2006/main" xmlns:r="http://schemas.openxmlformats.org/officeDocument/2006/relationships" xmlns:p="http://schemas.openxmlformats.org/presentationml/2006/main">
   <p:cSld>
     <p:bg>
@@ -18217,8 +18734,8 @@
         </p:nvSpPr>
         <p:spPr>
           <a:xfrm>
-            <a:off x="696528" y="158115"/>
-            <a:ext cx="5958038" cy="707886"/>
+            <a:off x="340392" y="200598"/>
+            <a:ext cx="7600449" cy="707886"/>
           </a:xfrm>
           <a:prstGeom prst="rect">
             <a:avLst/>
@@ -18237,7 +18754,7 @@
                   <a:schemeClr val="bg1"/>
                 </a:solidFill>
               </a:rPr>
-              <a:t>Future Enhancements</a:t>
+              <a:t>Future Enhancements/Next Steps</a:t>
             </a:r>
           </a:p>
         </p:txBody>
@@ -18394,7 +18911,7 @@
 </p:sld>
 </file>
 
-<file path=ppt/slides/slide18.xml><?xml version="1.0" encoding="utf-8"?>
+<file path=ppt/slides/slide19.xml><?xml version="1.0" encoding="utf-8"?>
 <p:sld xmlns:a="http://schemas.openxmlformats.org/drawingml/2006/main" xmlns:r="http://schemas.openxmlformats.org/officeDocument/2006/relationships" xmlns:p="http://schemas.openxmlformats.org/presentationml/2006/main">
   <p:cSld>
     <p:bg>
@@ -18770,7 +19287,1102 @@
 </p:sld>
 </file>
 
-<file path=ppt/slides/slide19.xml><?xml version="1.0" encoding="utf-8"?>
+<file path=ppt/slides/slide2.xml><?xml version="1.0" encoding="utf-8"?>
+<p:sld xmlns:a="http://schemas.openxmlformats.org/drawingml/2006/main" xmlns:r="http://schemas.openxmlformats.org/officeDocument/2006/relationships" xmlns:p="http://schemas.openxmlformats.org/presentationml/2006/main">
+  <p:cSld>
+    <p:bg>
+      <p:bgPr>
+        <a:solidFill>
+          <a:schemeClr val="bg1"/>
+        </a:solidFill>
+        <a:effectLst/>
+      </p:bgPr>
+    </p:bg>
+    <p:spTree>
+      <p:nvGrpSpPr>
+        <p:cNvPr id="1" name=""/>
+        <p:cNvGrpSpPr/>
+        <p:nvPr/>
+      </p:nvGrpSpPr>
+      <p:grpSpPr>
+        <a:xfrm>
+          <a:off x="0" y="0"/>
+          <a:ext cx="0" cy="0"/>
+          <a:chOff x="0" y="0"/>
+          <a:chExt cx="0" cy="0"/>
+        </a:xfrm>
+      </p:grpSpPr>
+      <p:sp useBgFill="1">
+        <p:nvSpPr>
+          <p:cNvPr id="8" name="Rectangle 7">
+            <a:extLst>
+              <a:ext uri="{FF2B5EF4-FFF2-40B4-BE49-F238E27FC236}">
+                <a16:creationId xmlns:a16="http://schemas.microsoft.com/office/drawing/2014/main" id="{577D6B2E-37A3-429E-A37C-F30ED6487282}"/>
+              </a:ext>
+              <a:ext uri="{C183D7F6-B498-43B3-948B-1728B52AA6E4}">
+                <adec:decorative xmlns:adec="http://schemas.microsoft.com/office/drawing/2017/decorative" val="1"/>
+              </a:ext>
+            </a:extLst>
+          </p:cNvPr>
+          <p:cNvSpPr>
+            <a:spLocks noGrp="1" noRot="1" noChangeAspect="1" noMove="1" noResize="1" noEditPoints="1" noAdjustHandles="1" noChangeArrowheads="1" noChangeShapeType="1" noTextEdit="1"/>
+          </p:cNvSpPr>
+          <p:nvPr>
+            <p:extLst>
+              <p:ext uri="{386F3935-93C4-4BCD-93E2-E3B085C9AB24}">
+                <p16:designElem xmlns:p16="http://schemas.microsoft.com/office/powerpoint/2015/main" val="1"/>
+              </p:ext>
+            </p:extLst>
+          </p:nvPr>
+        </p:nvSpPr>
+        <p:spPr>
+          <a:xfrm>
+            <a:off x="0" y="0"/>
+            <a:ext cx="12192000" cy="6858000"/>
+          </a:xfrm>
+          <a:prstGeom prst="rect">
+            <a:avLst/>
+          </a:prstGeom>
+          <a:ln w="12700" cap="flat" cmpd="sng" algn="ctr">
+            <a:noFill/>
+            <a:prstDash val="solid"/>
+            <a:miter lim="800000"/>
+          </a:ln>
+          <a:effectLst/>
+          <a:extLst>
+            <a:ext uri="{91240B29-F687-4F45-9708-019B960494DF}">
+              <a14:hiddenLine xmlns:a14="http://schemas.microsoft.com/office/drawing/2010/main" w="12700" cap="flat" cmpd="sng" algn="ctr">
+                <a:solidFill>
+                  <a:schemeClr val="accent1">
+                    <a:shade val="50000"/>
+                  </a:schemeClr>
+                </a:solidFill>
+                <a:prstDash val="solid"/>
+                <a:miter lim="800000"/>
+              </a14:hiddenLine>
+            </a:ext>
+          </a:extLst>
+        </p:spPr>
+        <p:style>
+          <a:lnRef idx="2">
+            <a:schemeClr val="accent1">
+              <a:shade val="50000"/>
+            </a:schemeClr>
+          </a:lnRef>
+          <a:fillRef idx="1">
+            <a:schemeClr val="accent1"/>
+          </a:fillRef>
+          <a:effectRef idx="0">
+            <a:schemeClr val="accent1"/>
+          </a:effectRef>
+          <a:fontRef idx="minor">
+            <a:schemeClr val="lt1"/>
+          </a:fontRef>
+        </p:style>
+        <p:txBody>
+          <a:bodyPr rtlCol="0" anchor="ctr"/>
+          <a:lstStyle/>
+          <a:p>
+            <a:pPr algn="ctr"/>
+            <a:endParaRPr lang="en-US"/>
+          </a:p>
+        </p:txBody>
+      </p:sp>
+      <p:sp>
+        <p:nvSpPr>
+          <p:cNvPr id="10" name="Rectangle 9">
+            <a:extLst>
+              <a:ext uri="{FF2B5EF4-FFF2-40B4-BE49-F238E27FC236}">
+                <a16:creationId xmlns:a16="http://schemas.microsoft.com/office/drawing/2014/main" id="{5CEAD642-85CF-4750-8432-7C80C901F001}"/>
+              </a:ext>
+              <a:ext uri="{C183D7F6-B498-43B3-948B-1728B52AA6E4}">
+                <adec:decorative xmlns:adec="http://schemas.microsoft.com/office/drawing/2017/decorative" val="1"/>
+              </a:ext>
+            </a:extLst>
+          </p:cNvPr>
+          <p:cNvSpPr>
+            <a:spLocks noGrp="1" noRot="1" noChangeAspect="1" noMove="1" noResize="1" noEditPoints="1" noAdjustHandles="1" noChangeArrowheads="1" noChangeShapeType="1" noTextEdit="1"/>
+          </p:cNvSpPr>
+          <p:nvPr>
+            <p:extLst>
+              <p:ext uri="{386F3935-93C4-4BCD-93E2-E3B085C9AB24}">
+                <p16:designElem xmlns:p16="http://schemas.microsoft.com/office/powerpoint/2015/main" val="1"/>
+              </p:ext>
+            </p:extLst>
+          </p:nvPr>
+        </p:nvSpPr>
+        <p:spPr>
+          <a:xfrm rot="10800000">
+            <a:off x="-11723" y="-1"/>
+            <a:ext cx="12225953" cy="6868071"/>
+          </a:xfrm>
+          <a:prstGeom prst="rect">
+            <a:avLst/>
+          </a:prstGeom>
+          <a:gradFill>
+            <a:gsLst>
+              <a:gs pos="0">
+                <a:srgbClr val="000000"/>
+              </a:gs>
+              <a:gs pos="100000">
+                <a:schemeClr val="accent1">
+                  <a:lumMod val="75000"/>
+                </a:schemeClr>
+              </a:gs>
+            </a:gsLst>
+            <a:lin ang="4200000" scaled="0"/>
+          </a:gradFill>
+          <a:ln>
+            <a:noFill/>
+          </a:ln>
+        </p:spPr>
+        <p:style>
+          <a:lnRef idx="2">
+            <a:schemeClr val="accent1">
+              <a:shade val="50000"/>
+            </a:schemeClr>
+          </a:lnRef>
+          <a:fillRef idx="1">
+            <a:schemeClr val="accent1"/>
+          </a:fillRef>
+          <a:effectRef idx="0">
+            <a:schemeClr val="accent1"/>
+          </a:effectRef>
+          <a:fontRef idx="minor">
+            <a:schemeClr val="lt1"/>
+          </a:fontRef>
+        </p:style>
+        <p:txBody>
+          <a:bodyPr rtlCol="0" anchor="ctr"/>
+          <a:lstStyle/>
+          <a:p>
+            <a:pPr algn="ctr"/>
+            <a:endParaRPr lang="en-US"/>
+          </a:p>
+        </p:txBody>
+      </p:sp>
+      <p:sp>
+        <p:nvSpPr>
+          <p:cNvPr id="12" name="Rectangle 11">
+            <a:extLst>
+              <a:ext uri="{FF2B5EF4-FFF2-40B4-BE49-F238E27FC236}">
+                <a16:creationId xmlns:a16="http://schemas.microsoft.com/office/drawing/2014/main" id="{FA33EEAE-15D5-4119-8C1E-89D943F911EF}"/>
+              </a:ext>
+              <a:ext uri="{C183D7F6-B498-43B3-948B-1728B52AA6E4}">
+                <adec:decorative xmlns:adec="http://schemas.microsoft.com/office/drawing/2017/decorative" val="1"/>
+              </a:ext>
+            </a:extLst>
+          </p:cNvPr>
+          <p:cNvSpPr>
+            <a:spLocks noGrp="1" noRot="1" noChangeAspect="1" noMove="1" noResize="1" noEditPoints="1" noAdjustHandles="1" noChangeArrowheads="1" noChangeShapeType="1" noTextEdit="1"/>
+          </p:cNvSpPr>
+          <p:nvPr>
+            <p:extLst>
+              <p:ext uri="{386F3935-93C4-4BCD-93E2-E3B085C9AB24}">
+                <p16:designElem xmlns:p16="http://schemas.microsoft.com/office/powerpoint/2015/main" val="1"/>
+              </p:ext>
+            </p:extLst>
+          </p:nvPr>
+        </p:nvSpPr>
+        <p:spPr>
+          <a:xfrm rot="10800000" flipH="1">
+            <a:off x="441959" y="-3"/>
+            <a:ext cx="11772269" cy="6868074"/>
+          </a:xfrm>
+          <a:prstGeom prst="rect">
+            <a:avLst/>
+          </a:prstGeom>
+          <a:gradFill>
+            <a:gsLst>
+              <a:gs pos="21000">
+                <a:schemeClr val="accent1">
+                  <a:lumMod val="50000"/>
+                  <a:alpha val="83000"/>
+                </a:schemeClr>
+              </a:gs>
+              <a:gs pos="100000">
+                <a:schemeClr val="accent1">
+                  <a:alpha val="0"/>
+                </a:schemeClr>
+              </a:gs>
+            </a:gsLst>
+            <a:lin ang="8400000" scaled="0"/>
+          </a:gradFill>
+          <a:ln>
+            <a:noFill/>
+          </a:ln>
+        </p:spPr>
+        <p:style>
+          <a:lnRef idx="2">
+            <a:schemeClr val="accent1">
+              <a:shade val="50000"/>
+            </a:schemeClr>
+          </a:lnRef>
+          <a:fillRef idx="1">
+            <a:schemeClr val="accent1"/>
+          </a:fillRef>
+          <a:effectRef idx="0">
+            <a:schemeClr val="accent1"/>
+          </a:effectRef>
+          <a:fontRef idx="minor">
+            <a:schemeClr val="lt1"/>
+          </a:fontRef>
+        </p:style>
+        <p:txBody>
+          <a:bodyPr rtlCol="0" anchor="ctr"/>
+          <a:lstStyle/>
+          <a:p>
+            <a:pPr algn="ctr"/>
+            <a:endParaRPr lang="en-US"/>
+          </a:p>
+        </p:txBody>
+      </p:sp>
+      <p:sp>
+        <p:nvSpPr>
+          <p:cNvPr id="14" name="Rectangle 13">
+            <a:extLst>
+              <a:ext uri="{FF2B5EF4-FFF2-40B4-BE49-F238E27FC236}">
+                <a16:creationId xmlns:a16="http://schemas.microsoft.com/office/drawing/2014/main" id="{730D8B3B-9B80-4025-B934-26DC7D7CD231}"/>
+              </a:ext>
+              <a:ext uri="{C183D7F6-B498-43B3-948B-1728B52AA6E4}">
+                <adec:decorative xmlns:adec="http://schemas.microsoft.com/office/drawing/2017/decorative" val="1"/>
+              </a:ext>
+            </a:extLst>
+          </p:cNvPr>
+          <p:cNvSpPr>
+            <a:spLocks noGrp="1" noRot="1" noChangeAspect="1" noMove="1" noResize="1" noEditPoints="1" noAdjustHandles="1" noChangeArrowheads="1" noChangeShapeType="1" noTextEdit="1"/>
+          </p:cNvSpPr>
+          <p:nvPr>
+            <p:extLst>
+              <p:ext uri="{386F3935-93C4-4BCD-93E2-E3B085C9AB24}">
+                <p16:designElem xmlns:p16="http://schemas.microsoft.com/office/powerpoint/2015/main" val="1"/>
+              </p:ext>
+            </p:extLst>
+          </p:nvPr>
+        </p:nvSpPr>
+        <p:spPr>
+          <a:xfrm rot="10800000">
+            <a:off x="-15200" y="0"/>
+            <a:ext cx="3623374" cy="6868072"/>
+          </a:xfrm>
+          <a:prstGeom prst="rect">
+            <a:avLst/>
+          </a:prstGeom>
+          <a:gradFill>
+            <a:gsLst>
+              <a:gs pos="0">
+                <a:schemeClr val="accent1">
+                  <a:lumMod val="75000"/>
+                  <a:alpha val="0"/>
+                </a:schemeClr>
+              </a:gs>
+              <a:gs pos="99000">
+                <a:srgbClr val="000000">
+                  <a:alpha val="41000"/>
+                </a:srgbClr>
+              </a:gs>
+            </a:gsLst>
+            <a:lin ang="13200000" scaled="0"/>
+          </a:gradFill>
+          <a:ln>
+            <a:noFill/>
+          </a:ln>
+        </p:spPr>
+        <p:style>
+          <a:lnRef idx="2">
+            <a:schemeClr val="accent1">
+              <a:shade val="50000"/>
+            </a:schemeClr>
+          </a:lnRef>
+          <a:fillRef idx="1">
+            <a:schemeClr val="accent1"/>
+          </a:fillRef>
+          <a:effectRef idx="0">
+            <a:schemeClr val="accent1"/>
+          </a:effectRef>
+          <a:fontRef idx="minor">
+            <a:schemeClr val="lt1"/>
+          </a:fontRef>
+        </p:style>
+        <p:txBody>
+          <a:bodyPr rtlCol="0" anchor="ctr"/>
+          <a:lstStyle/>
+          <a:p>
+            <a:pPr algn="ctr"/>
+            <a:endParaRPr lang="en-US"/>
+          </a:p>
+        </p:txBody>
+      </p:sp>
+      <p:sp>
+        <p:nvSpPr>
+          <p:cNvPr id="16" name="Rectangle 15">
+            <a:extLst>
+              <a:ext uri="{FF2B5EF4-FFF2-40B4-BE49-F238E27FC236}">
+                <a16:creationId xmlns:a16="http://schemas.microsoft.com/office/drawing/2014/main" id="{1064D5D5-227B-4F66-9AEA-46F570E793BD}"/>
+              </a:ext>
+              <a:ext uri="{C183D7F6-B498-43B3-948B-1728B52AA6E4}">
+                <adec:decorative xmlns:adec="http://schemas.microsoft.com/office/drawing/2017/decorative" val="1"/>
+              </a:ext>
+            </a:extLst>
+          </p:cNvPr>
+          <p:cNvSpPr>
+            <a:spLocks noGrp="1" noRot="1" noChangeAspect="1" noMove="1" noResize="1" noEditPoints="1" noAdjustHandles="1" noChangeArrowheads="1" noChangeShapeType="1" noTextEdit="1"/>
+          </p:cNvSpPr>
+          <p:nvPr>
+            <p:extLst>
+              <p:ext uri="{386F3935-93C4-4BCD-93E2-E3B085C9AB24}">
+                <p16:designElem xmlns:p16="http://schemas.microsoft.com/office/powerpoint/2015/main" val="1"/>
+              </p:ext>
+            </p:extLst>
+          </p:nvPr>
+        </p:nvSpPr>
+        <p:spPr>
+          <a:xfrm flipH="1">
+            <a:off x="-15875" y="-3"/>
+            <a:ext cx="12233581" cy="6868076"/>
+          </a:xfrm>
+          <a:prstGeom prst="rect">
+            <a:avLst/>
+          </a:prstGeom>
+          <a:gradFill>
+            <a:gsLst>
+              <a:gs pos="3000">
+                <a:schemeClr val="accent1">
+                  <a:lumMod val="75000"/>
+                  <a:alpha val="0"/>
+                </a:schemeClr>
+              </a:gs>
+              <a:gs pos="100000">
+                <a:srgbClr val="000000">
+                  <a:alpha val="73000"/>
+                </a:srgbClr>
+              </a:gs>
+            </a:gsLst>
+            <a:lin ang="17400000" scaled="0"/>
+          </a:gradFill>
+          <a:ln>
+            <a:noFill/>
+          </a:ln>
+        </p:spPr>
+        <p:style>
+          <a:lnRef idx="2">
+            <a:schemeClr val="accent1">
+              <a:shade val="50000"/>
+            </a:schemeClr>
+          </a:lnRef>
+          <a:fillRef idx="1">
+            <a:schemeClr val="accent1"/>
+          </a:fillRef>
+          <a:effectRef idx="0">
+            <a:schemeClr val="accent1"/>
+          </a:effectRef>
+          <a:fontRef idx="minor">
+            <a:schemeClr val="lt1"/>
+          </a:fontRef>
+        </p:style>
+        <p:txBody>
+          <a:bodyPr rtlCol="0" anchor="ctr"/>
+          <a:lstStyle/>
+          <a:p>
+            <a:pPr algn="ctr"/>
+            <a:endParaRPr lang="en-US"/>
+          </a:p>
+        </p:txBody>
+      </p:sp>
+      <p:sp>
+        <p:nvSpPr>
+          <p:cNvPr id="18" name="Rectangle 17">
+            <a:extLst>
+              <a:ext uri="{FF2B5EF4-FFF2-40B4-BE49-F238E27FC236}">
+                <a16:creationId xmlns:a16="http://schemas.microsoft.com/office/drawing/2014/main" id="{646B67A4-D328-4747-A82B-65E84FA46368}"/>
+              </a:ext>
+              <a:ext uri="{C183D7F6-B498-43B3-948B-1728B52AA6E4}">
+                <adec:decorative xmlns:adec="http://schemas.microsoft.com/office/drawing/2017/decorative" val="1"/>
+              </a:ext>
+            </a:extLst>
+          </p:cNvPr>
+          <p:cNvSpPr>
+            <a:spLocks noGrp="1" noRot="1" noChangeAspect="1" noMove="1" noResize="1" noEditPoints="1" noAdjustHandles="1" noChangeArrowheads="1" noChangeShapeType="1" noTextEdit="1"/>
+          </p:cNvSpPr>
+          <p:nvPr>
+            <p:extLst>
+              <p:ext uri="{386F3935-93C4-4BCD-93E2-E3B085C9AB24}">
+                <p16:designElem xmlns:p16="http://schemas.microsoft.com/office/powerpoint/2015/main" val="1"/>
+              </p:ext>
+            </p:extLst>
+          </p:nvPr>
+        </p:nvSpPr>
+        <p:spPr>
+          <a:xfrm rot="5400000" flipH="1">
+            <a:off x="4484334" y="-861824"/>
+            <a:ext cx="6861931" cy="8597859"/>
+          </a:xfrm>
+          <a:prstGeom prst="rect">
+            <a:avLst/>
+          </a:prstGeom>
+          <a:gradFill>
+            <a:gsLst>
+              <a:gs pos="3000">
+                <a:schemeClr val="accent1">
+                  <a:lumMod val="75000"/>
+                  <a:alpha val="0"/>
+                </a:schemeClr>
+              </a:gs>
+              <a:gs pos="100000">
+                <a:srgbClr val="000000">
+                  <a:alpha val="27000"/>
+                </a:srgbClr>
+              </a:gs>
+            </a:gsLst>
+            <a:lin ang="13800000" scaled="0"/>
+          </a:gradFill>
+          <a:ln>
+            <a:noFill/>
+          </a:ln>
+        </p:spPr>
+        <p:style>
+          <a:lnRef idx="2">
+            <a:schemeClr val="accent1">
+              <a:shade val="50000"/>
+            </a:schemeClr>
+          </a:lnRef>
+          <a:fillRef idx="1">
+            <a:schemeClr val="accent1"/>
+          </a:fillRef>
+          <a:effectRef idx="0">
+            <a:schemeClr val="accent1"/>
+          </a:effectRef>
+          <a:fontRef idx="minor">
+            <a:schemeClr val="lt1"/>
+          </a:fontRef>
+        </p:style>
+        <p:txBody>
+          <a:bodyPr rtlCol="0" anchor="ctr"/>
+          <a:lstStyle/>
+          <a:p>
+            <a:pPr algn="ctr"/>
+            <a:endParaRPr lang="en-US"/>
+          </a:p>
+        </p:txBody>
+      </p:sp>
+      <p:sp>
+        <p:nvSpPr>
+          <p:cNvPr id="20" name="Oval 19">
+            <a:extLst>
+              <a:ext uri="{FF2B5EF4-FFF2-40B4-BE49-F238E27FC236}">
+                <a16:creationId xmlns:a16="http://schemas.microsoft.com/office/drawing/2014/main" id="{B5A1B09C-1565-46F8-B70F-621C5EB48A09}"/>
+              </a:ext>
+              <a:ext uri="{C183D7F6-B498-43B3-948B-1728B52AA6E4}">
+                <adec:decorative xmlns:adec="http://schemas.microsoft.com/office/drawing/2017/decorative" val="1"/>
+              </a:ext>
+            </a:extLst>
+          </p:cNvPr>
+          <p:cNvSpPr>
+            <a:spLocks noGrp="1" noRot="1" noChangeAspect="1" noMove="1" noResize="1" noEditPoints="1" noAdjustHandles="1" noChangeArrowheads="1" noChangeShapeType="1" noTextEdit="1"/>
+          </p:cNvSpPr>
+          <p:nvPr>
+            <p:extLst>
+              <p:ext uri="{386F3935-93C4-4BCD-93E2-E3B085C9AB24}">
+                <p16:designElem xmlns:p16="http://schemas.microsoft.com/office/powerpoint/2015/main" val="1"/>
+              </p:ext>
+            </p:extLst>
+          </p:nvPr>
+        </p:nvSpPr>
+        <p:spPr>
+          <a:xfrm rot="5993193">
+            <a:off x="1186972" y="1089049"/>
+            <a:ext cx="4967533" cy="4988390"/>
+          </a:xfrm>
+          <a:prstGeom prst="ellipse">
+            <a:avLst/>
+          </a:prstGeom>
+          <a:gradFill>
+            <a:gsLst>
+              <a:gs pos="0">
+                <a:schemeClr val="accent1">
+                  <a:alpha val="26000"/>
+                </a:schemeClr>
+              </a:gs>
+              <a:gs pos="85000">
+                <a:schemeClr val="accent1">
+                  <a:lumMod val="60000"/>
+                  <a:lumOff val="40000"/>
+                  <a:alpha val="0"/>
+                </a:schemeClr>
+              </a:gs>
+            </a:gsLst>
+            <a:lin ang="14400000" scaled="0"/>
+          </a:gradFill>
+          <a:ln>
+            <a:noFill/>
+          </a:ln>
+        </p:spPr>
+        <p:style>
+          <a:lnRef idx="2">
+            <a:schemeClr val="accent1">
+              <a:shade val="50000"/>
+            </a:schemeClr>
+          </a:lnRef>
+          <a:fillRef idx="1">
+            <a:schemeClr val="accent1"/>
+          </a:fillRef>
+          <a:effectRef idx="0">
+            <a:schemeClr val="accent1"/>
+          </a:effectRef>
+          <a:fontRef idx="minor">
+            <a:schemeClr val="lt1"/>
+          </a:fontRef>
+        </p:style>
+        <p:txBody>
+          <a:bodyPr rtlCol="0" anchor="ctr"/>
+          <a:lstStyle/>
+          <a:p>
+            <a:pPr algn="ctr"/>
+            <a:endParaRPr lang="en-US" dirty="0"/>
+          </a:p>
+        </p:txBody>
+      </p:sp>
+      <p:sp>
+        <p:nvSpPr>
+          <p:cNvPr id="2" name="Title 1">
+            <a:extLst>
+              <a:ext uri="{FF2B5EF4-FFF2-40B4-BE49-F238E27FC236}">
+                <a16:creationId xmlns:a16="http://schemas.microsoft.com/office/drawing/2014/main" id="{7B300DB8-FAC5-4151-9E14-62204241D4B1}"/>
+              </a:ext>
+            </a:extLst>
+          </p:cNvPr>
+          <p:cNvSpPr>
+            <a:spLocks noGrp="1"/>
+          </p:cNvSpPr>
+          <p:nvPr>
+            <p:ph type="ctrTitle"/>
+          </p:nvPr>
+        </p:nvSpPr>
+        <p:spPr>
+          <a:xfrm>
+            <a:off x="586245" y="135651"/>
+            <a:ext cx="8597859" cy="778810"/>
+          </a:xfrm>
+        </p:spPr>
+        <p:txBody>
+          <a:bodyPr>
+            <a:normAutofit fontScale="90000"/>
+          </a:bodyPr>
+          <a:lstStyle/>
+          <a:p>
+            <a:pPr algn="l"/>
+            <a:r>
+              <a:rPr lang="en-US" sz="4800" dirty="0">
+                <a:solidFill>
+                  <a:srgbClr val="FFFFFF"/>
+                </a:solidFill>
+              </a:rPr>
+              <a:t>Executive Summary and Project Goals</a:t>
+            </a:r>
+          </a:p>
+        </p:txBody>
+      </p:sp>
+      <p:sp>
+        <p:nvSpPr>
+          <p:cNvPr id="22" name="Rectangle 21">
+            <a:extLst>
+              <a:ext uri="{FF2B5EF4-FFF2-40B4-BE49-F238E27FC236}">
+                <a16:creationId xmlns:a16="http://schemas.microsoft.com/office/drawing/2014/main" id="{8C516CC8-80AC-446C-A56E-9F54B7210402}"/>
+              </a:ext>
+              <a:ext uri="{C183D7F6-B498-43B3-948B-1728B52AA6E4}">
+                <adec:decorative xmlns:adec="http://schemas.microsoft.com/office/drawing/2017/decorative" val="1"/>
+              </a:ext>
+            </a:extLst>
+          </p:cNvPr>
+          <p:cNvSpPr>
+            <a:spLocks noGrp="1" noRot="1" noChangeAspect="1" noMove="1" noResize="1" noEditPoints="1" noAdjustHandles="1" noChangeArrowheads="1" noChangeShapeType="1" noTextEdit="1"/>
+          </p:cNvSpPr>
+          <p:nvPr>
+            <p:extLst>
+              <p:ext uri="{386F3935-93C4-4BCD-93E2-E3B085C9AB24}">
+                <p16:designElem xmlns:p16="http://schemas.microsoft.com/office/powerpoint/2015/main" val="1"/>
+              </p:ext>
+            </p:extLst>
+          </p:nvPr>
+        </p:nvSpPr>
+        <p:spPr>
+          <a:xfrm flipH="1">
+            <a:off x="-3" y="4490110"/>
+            <a:ext cx="12217710" cy="2377962"/>
+          </a:xfrm>
+          <a:prstGeom prst="rect">
+            <a:avLst/>
+          </a:prstGeom>
+          <a:gradFill>
+            <a:gsLst>
+              <a:gs pos="0">
+                <a:schemeClr val="accent1">
+                  <a:lumMod val="75000"/>
+                  <a:alpha val="50000"/>
+                </a:schemeClr>
+              </a:gs>
+              <a:gs pos="99000">
+                <a:srgbClr val="000000">
+                  <a:alpha val="34000"/>
+                </a:srgbClr>
+              </a:gs>
+            </a:gsLst>
+            <a:lin ang="13200000" scaled="0"/>
+          </a:gradFill>
+          <a:ln>
+            <a:noFill/>
+          </a:ln>
+        </p:spPr>
+        <p:style>
+          <a:lnRef idx="2">
+            <a:schemeClr val="accent1">
+              <a:shade val="50000"/>
+            </a:schemeClr>
+          </a:lnRef>
+          <a:fillRef idx="1">
+            <a:schemeClr val="accent1"/>
+          </a:fillRef>
+          <a:effectRef idx="0">
+            <a:schemeClr val="accent1"/>
+          </a:effectRef>
+          <a:fontRef idx="minor">
+            <a:schemeClr val="lt1"/>
+          </a:fontRef>
+        </p:style>
+        <p:txBody>
+          <a:bodyPr rtlCol="0" anchor="ctr"/>
+          <a:lstStyle/>
+          <a:p>
+            <a:pPr algn="ctr"/>
+            <a:endParaRPr lang="en-US"/>
+          </a:p>
+        </p:txBody>
+      </p:sp>
+      <p:sp>
+        <p:nvSpPr>
+          <p:cNvPr id="15" name="Content Placeholder 2">
+            <a:extLst>
+              <a:ext uri="{FF2B5EF4-FFF2-40B4-BE49-F238E27FC236}">
+                <a16:creationId xmlns:a16="http://schemas.microsoft.com/office/drawing/2014/main" id="{82AC6C7D-3F6D-4BAF-8E72-8679D0C75833}"/>
+              </a:ext>
+            </a:extLst>
+          </p:cNvPr>
+          <p:cNvSpPr txBox="1">
+            <a:spLocks/>
+          </p:cNvSpPr>
+          <p:nvPr/>
+        </p:nvSpPr>
+        <p:spPr>
+          <a:xfrm>
+            <a:off x="586245" y="1138958"/>
+            <a:ext cx="11262453" cy="5597460"/>
+          </a:xfrm>
+          <a:prstGeom prst="rect">
+            <a:avLst/>
+          </a:prstGeom>
+        </p:spPr>
+        <p:txBody>
+          <a:bodyPr vert="horz" lIns="91440" tIns="45720" rIns="91440" bIns="45720" rtlCol="0">
+            <a:normAutofit lnSpcReduction="10000"/>
+          </a:bodyPr>
+          <a:lstStyle>
+            <a:lvl1pPr marL="0" indent="0" algn="ctr" defTabSz="914400" rtl="0" eaLnBrk="1" latinLnBrk="0" hangingPunct="1">
+              <a:lnSpc>
+                <a:spcPct val="90000"/>
+              </a:lnSpc>
+              <a:spcBef>
+                <a:spcPts val="1000"/>
+              </a:spcBef>
+              <a:buFont typeface="Arial" panose="020B0604020202020204" pitchFamily="34" charset="0"/>
+              <a:buNone/>
+              <a:defRPr sz="2400" kern="1200">
+                <a:solidFill>
+                  <a:schemeClr val="tx1"/>
+                </a:solidFill>
+                <a:latin typeface="+mn-lt"/>
+                <a:ea typeface="+mn-ea"/>
+                <a:cs typeface="+mn-cs"/>
+              </a:defRPr>
+            </a:lvl1pPr>
+            <a:lvl2pPr marL="457200" indent="0" algn="ctr" defTabSz="914400" rtl="0" eaLnBrk="1" latinLnBrk="0" hangingPunct="1">
+              <a:lnSpc>
+                <a:spcPct val="90000"/>
+              </a:lnSpc>
+              <a:spcBef>
+                <a:spcPts val="500"/>
+              </a:spcBef>
+              <a:buFont typeface="Arial" panose="020B0604020202020204" pitchFamily="34" charset="0"/>
+              <a:buNone/>
+              <a:defRPr sz="2000" kern="1200">
+                <a:solidFill>
+                  <a:schemeClr val="tx1"/>
+                </a:solidFill>
+                <a:latin typeface="+mn-lt"/>
+                <a:ea typeface="+mn-ea"/>
+                <a:cs typeface="+mn-cs"/>
+              </a:defRPr>
+            </a:lvl2pPr>
+            <a:lvl3pPr marL="914400" indent="0" algn="ctr" defTabSz="914400" rtl="0" eaLnBrk="1" latinLnBrk="0" hangingPunct="1">
+              <a:lnSpc>
+                <a:spcPct val="90000"/>
+              </a:lnSpc>
+              <a:spcBef>
+                <a:spcPts val="500"/>
+              </a:spcBef>
+              <a:buFont typeface="Arial" panose="020B0604020202020204" pitchFamily="34" charset="0"/>
+              <a:buNone/>
+              <a:defRPr sz="1800" kern="1200">
+                <a:solidFill>
+                  <a:schemeClr val="tx1"/>
+                </a:solidFill>
+                <a:latin typeface="+mn-lt"/>
+                <a:ea typeface="+mn-ea"/>
+                <a:cs typeface="+mn-cs"/>
+              </a:defRPr>
+            </a:lvl3pPr>
+            <a:lvl4pPr marL="1371600" indent="0" algn="ctr" defTabSz="914400" rtl="0" eaLnBrk="1" latinLnBrk="0" hangingPunct="1">
+              <a:lnSpc>
+                <a:spcPct val="90000"/>
+              </a:lnSpc>
+              <a:spcBef>
+                <a:spcPts val="500"/>
+              </a:spcBef>
+              <a:buFont typeface="Arial" panose="020B0604020202020204" pitchFamily="34" charset="0"/>
+              <a:buNone/>
+              <a:defRPr sz="1600" kern="1200">
+                <a:solidFill>
+                  <a:schemeClr val="tx1"/>
+                </a:solidFill>
+                <a:latin typeface="+mn-lt"/>
+                <a:ea typeface="+mn-ea"/>
+                <a:cs typeface="+mn-cs"/>
+              </a:defRPr>
+            </a:lvl4pPr>
+            <a:lvl5pPr marL="1828800" indent="0" algn="ctr" defTabSz="914400" rtl="0" eaLnBrk="1" latinLnBrk="0" hangingPunct="1">
+              <a:lnSpc>
+                <a:spcPct val="90000"/>
+              </a:lnSpc>
+              <a:spcBef>
+                <a:spcPts val="500"/>
+              </a:spcBef>
+              <a:buFont typeface="Arial" panose="020B0604020202020204" pitchFamily="34" charset="0"/>
+              <a:buNone/>
+              <a:defRPr sz="1600" kern="1200">
+                <a:solidFill>
+                  <a:schemeClr val="tx1"/>
+                </a:solidFill>
+                <a:latin typeface="+mn-lt"/>
+                <a:ea typeface="+mn-ea"/>
+                <a:cs typeface="+mn-cs"/>
+              </a:defRPr>
+            </a:lvl5pPr>
+            <a:lvl6pPr marL="2286000" indent="0" algn="ctr" defTabSz="914400" rtl="0" eaLnBrk="1" latinLnBrk="0" hangingPunct="1">
+              <a:lnSpc>
+                <a:spcPct val="90000"/>
+              </a:lnSpc>
+              <a:spcBef>
+                <a:spcPts val="500"/>
+              </a:spcBef>
+              <a:buFont typeface="Arial" panose="020B0604020202020204" pitchFamily="34" charset="0"/>
+              <a:buNone/>
+              <a:defRPr sz="1600" kern="1200">
+                <a:solidFill>
+                  <a:schemeClr val="tx1"/>
+                </a:solidFill>
+                <a:latin typeface="+mn-lt"/>
+                <a:ea typeface="+mn-ea"/>
+                <a:cs typeface="+mn-cs"/>
+              </a:defRPr>
+            </a:lvl6pPr>
+            <a:lvl7pPr marL="2743200" indent="0" algn="ctr" defTabSz="914400" rtl="0" eaLnBrk="1" latinLnBrk="0" hangingPunct="1">
+              <a:lnSpc>
+                <a:spcPct val="90000"/>
+              </a:lnSpc>
+              <a:spcBef>
+                <a:spcPts val="500"/>
+              </a:spcBef>
+              <a:buFont typeface="Arial" panose="020B0604020202020204" pitchFamily="34" charset="0"/>
+              <a:buNone/>
+              <a:defRPr sz="1600" kern="1200">
+                <a:solidFill>
+                  <a:schemeClr val="tx1"/>
+                </a:solidFill>
+                <a:latin typeface="+mn-lt"/>
+                <a:ea typeface="+mn-ea"/>
+                <a:cs typeface="+mn-cs"/>
+              </a:defRPr>
+            </a:lvl7pPr>
+            <a:lvl8pPr marL="3200400" indent="0" algn="ctr" defTabSz="914400" rtl="0" eaLnBrk="1" latinLnBrk="0" hangingPunct="1">
+              <a:lnSpc>
+                <a:spcPct val="90000"/>
+              </a:lnSpc>
+              <a:spcBef>
+                <a:spcPts val="500"/>
+              </a:spcBef>
+              <a:buFont typeface="Arial" panose="020B0604020202020204" pitchFamily="34" charset="0"/>
+              <a:buNone/>
+              <a:defRPr sz="1600" kern="1200">
+                <a:solidFill>
+                  <a:schemeClr val="tx1"/>
+                </a:solidFill>
+                <a:latin typeface="+mn-lt"/>
+                <a:ea typeface="+mn-ea"/>
+                <a:cs typeface="+mn-cs"/>
+              </a:defRPr>
+            </a:lvl8pPr>
+            <a:lvl9pPr marL="3657600" indent="0" algn="ctr" defTabSz="914400" rtl="0" eaLnBrk="1" latinLnBrk="0" hangingPunct="1">
+              <a:lnSpc>
+                <a:spcPct val="90000"/>
+              </a:lnSpc>
+              <a:spcBef>
+                <a:spcPts val="500"/>
+              </a:spcBef>
+              <a:buFont typeface="Arial" panose="020B0604020202020204" pitchFamily="34" charset="0"/>
+              <a:buNone/>
+              <a:defRPr sz="1600" kern="1200">
+                <a:solidFill>
+                  <a:schemeClr val="tx1"/>
+                </a:solidFill>
+                <a:latin typeface="+mn-lt"/>
+                <a:ea typeface="+mn-ea"/>
+                <a:cs typeface="+mn-cs"/>
+              </a:defRPr>
+            </a:lvl9pPr>
+          </a:lstStyle>
+          <a:p>
+            <a:pPr marL="342900" indent="-342900" algn="l">
+              <a:buFont typeface="Arial" panose="020B0604020202020204" pitchFamily="34" charset="0"/>
+              <a:buChar char="•"/>
+            </a:pPr>
+            <a:r>
+              <a:rPr lang="en-US" dirty="0">
+                <a:solidFill>
+                  <a:schemeClr val="bg1"/>
+                </a:solidFill>
+              </a:rPr>
+              <a:t>Identify the best tool to pick tickers for diversification</a:t>
+            </a:r>
+          </a:p>
+          <a:p>
+            <a:pPr marL="342900" indent="-342900" algn="l">
+              <a:buFont typeface="Arial" panose="020B0604020202020204" pitchFamily="34" charset="0"/>
+              <a:buChar char="•"/>
+            </a:pPr>
+            <a:r>
+              <a:rPr lang="en-US" dirty="0">
+                <a:solidFill>
+                  <a:schemeClr val="bg1"/>
+                </a:solidFill>
+              </a:rPr>
+              <a:t>Show why using Sharp is not a good idea to pick tickers for diversification</a:t>
+            </a:r>
+          </a:p>
+          <a:p>
+            <a:pPr marL="342900" indent="-342900" algn="l">
+              <a:buFont typeface="Arial" panose="020B0604020202020204" pitchFamily="34" charset="0"/>
+              <a:buChar char="•"/>
+            </a:pPr>
+            <a:r>
+              <a:rPr lang="en-US" dirty="0">
+                <a:solidFill>
+                  <a:schemeClr val="bg1"/>
+                </a:solidFill>
+              </a:rPr>
+              <a:t>Introduce WARP and show how easy it to use and why it is better than Sharpe</a:t>
+            </a:r>
+          </a:p>
+          <a:p>
+            <a:pPr marL="342900" indent="-342900" algn="l">
+              <a:buFont typeface="Arial" panose="020B0604020202020204" pitchFamily="34" charset="0"/>
+              <a:buChar char="•"/>
+            </a:pPr>
+            <a:r>
+              <a:rPr lang="en-US" dirty="0">
+                <a:solidFill>
+                  <a:schemeClr val="bg1"/>
+                </a:solidFill>
+              </a:rPr>
+              <a:t>Pick tickers using WARP and Sharpe and compare them</a:t>
+            </a:r>
+          </a:p>
+          <a:p>
+            <a:pPr marL="342900" indent="-342900" algn="l">
+              <a:buFont typeface="Arial" panose="020B0604020202020204" pitchFamily="34" charset="0"/>
+              <a:buChar char="•"/>
+            </a:pPr>
+            <a:r>
+              <a:rPr lang="en-US" dirty="0">
+                <a:solidFill>
+                  <a:schemeClr val="bg1"/>
+                </a:solidFill>
+              </a:rPr>
+              <a:t>Analyze the data from 2008 to 2020 to show that WARP performs better than Sharpe and provides more protection in bear markets and downturns</a:t>
+            </a:r>
+          </a:p>
+          <a:p>
+            <a:pPr marL="342900" indent="-342900" algn="l">
+              <a:buFont typeface="Arial" panose="020B0604020202020204" pitchFamily="34" charset="0"/>
+              <a:buChar char="•"/>
+            </a:pPr>
+            <a:r>
+              <a:rPr lang="en-US" dirty="0">
+                <a:solidFill>
+                  <a:schemeClr val="bg1"/>
+                </a:solidFill>
+              </a:rPr>
+              <a:t>Identify the best ticker for diversification based on the historical analysis and the best available tool.</a:t>
+            </a:r>
+          </a:p>
+          <a:p>
+            <a:pPr marL="342900" indent="-342900" algn="l">
+              <a:buFont typeface="Arial" panose="020B0604020202020204" pitchFamily="34" charset="0"/>
+              <a:buChar char="•"/>
+            </a:pPr>
+            <a:r>
+              <a:rPr lang="en-US" dirty="0">
+                <a:solidFill>
+                  <a:schemeClr val="bg1"/>
+                </a:solidFill>
+              </a:rPr>
+              <a:t>Use Monte Carlo to Forecast the performance of a portfolio based on the best ticker identified </a:t>
+            </a:r>
+          </a:p>
+          <a:p>
+            <a:pPr marL="342900" indent="-342900" algn="l">
+              <a:buFont typeface="Arial" panose="020B0604020202020204" pitchFamily="34" charset="0"/>
+              <a:buChar char="•"/>
+            </a:pPr>
+            <a:r>
+              <a:rPr lang="en-US" dirty="0">
+                <a:solidFill>
+                  <a:schemeClr val="bg1"/>
+                </a:solidFill>
+              </a:rPr>
+              <a:t>Identify Target Customers for the application</a:t>
+            </a:r>
+          </a:p>
+          <a:p>
+            <a:pPr marL="342900" indent="-342900" algn="l">
+              <a:buFont typeface="Arial" panose="020B0604020202020204" pitchFamily="34" charset="0"/>
+              <a:buChar char="•"/>
+            </a:pPr>
+            <a:r>
+              <a:rPr lang="en-US" dirty="0">
+                <a:solidFill>
+                  <a:schemeClr val="bg1"/>
+                </a:solidFill>
+              </a:rPr>
+              <a:t>Use questionary and Dash to provide a seamless UI for the customers to easily navigate their diversification needs with a guided interface which provides recommendations</a:t>
+            </a:r>
+          </a:p>
+        </p:txBody>
+      </p:sp>
+    </p:spTree>
+    <p:extLst>
+      <p:ext uri="{BB962C8B-B14F-4D97-AF65-F5344CB8AC3E}">
+        <p14:creationId xmlns:p14="http://schemas.microsoft.com/office/powerpoint/2010/main" val="3520916530"/>
+      </p:ext>
+    </p:extLst>
+  </p:cSld>
+  <p:clrMapOvr>
+    <a:masterClrMapping/>
+  </p:clrMapOvr>
+  <p:timing>
+    <p:tnLst>
+      <p:par>
+        <p:cTn id="1" dur="indefinite" restart="never" nodeType="tmRoot">
+          <p:childTnLst>
+            <p:seq concurrent="1" nextAc="seek">
+              <p:cTn id="2" dur="indefinite" nodeType="mainSeq">
+                <p:childTnLst>
+                  <p:par>
+                    <p:cTn id="3" fill="hold">
+                      <p:stCondLst>
+                        <p:cond delay="indefinite"/>
+                        <p:cond evt="onBegin" delay="0">
+                          <p:tn val="2"/>
+                        </p:cond>
+                      </p:stCondLst>
+                      <p:childTnLst>
+                        <p:par>
+                          <p:cTn id="4" fill="hold">
+                            <p:stCondLst>
+                              <p:cond delay="0"/>
+                            </p:stCondLst>
+                            <p:childTnLst>
+                              <p:par>
+                                <p:cTn id="5" presetID="10" presetClass="entr" presetSubtype="0" fill="hold" grpId="0" nodeType="withEffect">
+                                  <p:stCondLst>
+                                    <p:cond delay="500"/>
+                                  </p:stCondLst>
+                                  <p:iterate>
+                                    <p:tmPct val="10000"/>
+                                  </p:iterate>
+                                  <p:childTnLst>
+                                    <p:set>
+                                      <p:cBhvr>
+                                        <p:cTn id="6" dur="1" fill="hold">
+                                          <p:stCondLst>
+                                            <p:cond delay="0"/>
+                                          </p:stCondLst>
+                                        </p:cTn>
+                                        <p:tgtEl>
+                                          <p:spTgt spid="2"/>
+                                        </p:tgtEl>
+                                        <p:attrNameLst>
+                                          <p:attrName>style.visibility</p:attrName>
+                                        </p:attrNameLst>
+                                      </p:cBhvr>
+                                      <p:to>
+                                        <p:strVal val="visible"/>
+                                      </p:to>
+                                    </p:set>
+                                    <p:animEffect transition="in" filter="fade">
+                                      <p:cBhvr>
+                                        <p:cTn id="7" dur="700"/>
+                                        <p:tgtEl>
+                                          <p:spTgt spid="2"/>
+                                        </p:tgtEl>
+                                      </p:cBhvr>
+                                    </p:animEffect>
+                                  </p:childTnLst>
+                                </p:cTn>
+                              </p:par>
+                            </p:childTnLst>
+                          </p:cTn>
+                        </p:par>
+                      </p:childTnLst>
+                    </p:cTn>
+                  </p:par>
+                </p:childTnLst>
+              </p:cTn>
+              <p:prevCondLst>
+                <p:cond evt="onPrev" delay="0">
+                  <p:tgtEl>
+                    <p:sldTgt/>
+                  </p:tgtEl>
+                </p:cond>
+              </p:prevCondLst>
+              <p:nextCondLst>
+                <p:cond evt="onNext" delay="0">
+                  <p:tgtEl>
+                    <p:sldTgt/>
+                  </p:tgtEl>
+                </p:cond>
+              </p:nextCondLst>
+            </p:seq>
+          </p:childTnLst>
+        </p:cTn>
+      </p:par>
+    </p:tnLst>
+    <p:bldLst>
+      <p:bldP spid="2" grpId="0"/>
+    </p:bldLst>
+  </p:timing>
+</p:sld>
+</file>
+
+<file path=ppt/slides/slide20.xml><?xml version="1.0" encoding="utf-8"?>
 <p:sld xmlns:a="http://schemas.openxmlformats.org/drawingml/2006/main" xmlns:r="http://schemas.openxmlformats.org/officeDocument/2006/relationships" xmlns:p="http://schemas.openxmlformats.org/presentationml/2006/main">
   <p:cSld>
     <p:bg>
@@ -19560,7 +21172,7 @@
 </p:sld>
 </file>
 
-<file path=ppt/slides/slide2.xml><?xml version="1.0" encoding="utf-8"?>
+<file path=ppt/slides/slide3.xml><?xml version="1.0" encoding="utf-8"?>
 <p:sld xmlns:a="http://schemas.openxmlformats.org/drawingml/2006/main" xmlns:r="http://schemas.openxmlformats.org/officeDocument/2006/relationships" xmlns:p="http://schemas.openxmlformats.org/presentationml/2006/main">
   <p:cSld>
     <p:bg>
@@ -20087,7 +21699,7 @@
 </p:sld>
 </file>
 
-<file path=ppt/slides/slide3.xml><?xml version="1.0" encoding="utf-8"?>
+<file path=ppt/slides/slide4.xml><?xml version="1.0" encoding="utf-8"?>
 <p:sld xmlns:a="http://schemas.openxmlformats.org/drawingml/2006/main" xmlns:r="http://schemas.openxmlformats.org/officeDocument/2006/relationships" xmlns:p="http://schemas.openxmlformats.org/presentationml/2006/main">
   <p:cSld>
     <p:bg>
@@ -20912,7 +22524,7 @@
 </p:sld>
 </file>
 
-<file path=ppt/slides/slide4.xml><?xml version="1.0" encoding="utf-8"?>
+<file path=ppt/slides/slide5.xml><?xml version="1.0" encoding="utf-8"?>
 <p:sld xmlns:a="http://schemas.openxmlformats.org/drawingml/2006/main" xmlns:r="http://schemas.openxmlformats.org/officeDocument/2006/relationships" xmlns:p="http://schemas.openxmlformats.org/presentationml/2006/main">
   <p:cSld>
     <p:bg>
@@ -21049,7 +22661,7 @@
 </p:sld>
 </file>
 
-<file path=ppt/slides/slide5.xml><?xml version="1.0" encoding="utf-8"?>
+<file path=ppt/slides/slide6.xml><?xml version="1.0" encoding="utf-8"?>
 <p:sld xmlns:a="http://schemas.openxmlformats.org/drawingml/2006/main" xmlns:r="http://schemas.openxmlformats.org/officeDocument/2006/relationships" xmlns:p="http://schemas.openxmlformats.org/presentationml/2006/main">
   <p:cSld>
     <p:spTree>
@@ -21242,6 +22854,112 @@
           </a:p>
         </p:txBody>
       </p:sp>
+      <p:sp>
+        <p:nvSpPr>
+          <p:cNvPr id="2" name="TextBox 1">
+            <a:extLst>
+              <a:ext uri="{FF2B5EF4-FFF2-40B4-BE49-F238E27FC236}">
+                <a16:creationId xmlns:a16="http://schemas.microsoft.com/office/drawing/2014/main" id="{A781B4F3-AC75-47A9-A72A-0512D4B6DE86}"/>
+              </a:ext>
+            </a:extLst>
+          </p:cNvPr>
+          <p:cNvSpPr txBox="1"/>
+          <p:nvPr/>
+        </p:nvSpPr>
+        <p:spPr>
+          <a:xfrm>
+            <a:off x="2156058" y="2662731"/>
+            <a:ext cx="5361272" cy="369332"/>
+          </a:xfrm>
+          <a:prstGeom prst="rect">
+            <a:avLst/>
+          </a:prstGeom>
+          <a:noFill/>
+        </p:spPr>
+        <p:txBody>
+          <a:bodyPr wrap="square" rtlCol="0">
+            <a:spAutoFit/>
+          </a:bodyPr>
+          <a:lstStyle/>
+          <a:p>
+            <a:r>
+              <a:rPr lang="en-US" dirty="0">
+                <a:solidFill>
+                  <a:schemeClr val="bg1"/>
+                </a:solidFill>
+              </a:rPr>
+              <a:t>WARP suggests </a:t>
+            </a:r>
+            <a:r>
+              <a:rPr lang="en-US" dirty="0" err="1">
+                <a:solidFill>
+                  <a:schemeClr val="bg1"/>
+                </a:solidFill>
+              </a:rPr>
+              <a:t>tlt</a:t>
+            </a:r>
+            <a:r>
+              <a:rPr lang="en-US" dirty="0">
+                <a:solidFill>
+                  <a:schemeClr val="bg1"/>
+                </a:solidFill>
+              </a:rPr>
+              <a:t> and </a:t>
+            </a:r>
+            <a:r>
+              <a:rPr lang="en-US" dirty="0" err="1">
+                <a:solidFill>
+                  <a:schemeClr val="bg1"/>
+                </a:solidFill>
+              </a:rPr>
+              <a:t>gld</a:t>
+            </a:r>
+            <a:r>
+              <a:rPr lang="en-US" dirty="0">
+                <a:solidFill>
+                  <a:schemeClr val="bg1"/>
+                </a:solidFill>
+              </a:rPr>
+              <a:t> are the best diversifiers  </a:t>
+            </a:r>
+          </a:p>
+        </p:txBody>
+      </p:sp>
+      <p:sp>
+        <p:nvSpPr>
+          <p:cNvPr id="8" name="TextBox 7">
+            <a:extLst>
+              <a:ext uri="{FF2B5EF4-FFF2-40B4-BE49-F238E27FC236}">
+                <a16:creationId xmlns:a16="http://schemas.microsoft.com/office/drawing/2014/main" id="{88D63F7B-4BD3-4862-9F60-DAF5F4AAC637}"/>
+              </a:ext>
+            </a:extLst>
+          </p:cNvPr>
+          <p:cNvSpPr txBox="1"/>
+          <p:nvPr/>
+        </p:nvSpPr>
+        <p:spPr>
+          <a:xfrm>
+            <a:off x="1898489" y="6456969"/>
+            <a:ext cx="6097604" cy="369332"/>
+          </a:xfrm>
+          <a:prstGeom prst="rect">
+            <a:avLst/>
+          </a:prstGeom>
+          <a:noFill/>
+        </p:spPr>
+        <p:txBody>
+          <a:bodyPr wrap="square">
+            <a:spAutoFit/>
+          </a:bodyPr>
+          <a:lstStyle/>
+          <a:p>
+            <a:r>
+              <a:rPr lang="en-US" dirty="0"/>
+              <a:t>Sharpe suggests shy is the best diversifier  </a:t>
+            </a:r>
+          </a:p>
+        </p:txBody>
+      </p:sp>
     </p:spTree>
     <p:extLst>
       <p:ext uri="{BB962C8B-B14F-4D97-AF65-F5344CB8AC3E}">
@@ -21255,7 +22973,7 @@
 </p:sld>
 </file>
 
-<file path=ppt/slides/slide6.xml><?xml version="1.0" encoding="utf-8"?>
+<file path=ppt/slides/slide7.xml><?xml version="1.0" encoding="utf-8"?>
 <p:sld xmlns:a="http://schemas.openxmlformats.org/drawingml/2006/main" xmlns:r="http://schemas.openxmlformats.org/officeDocument/2006/relationships" xmlns:p="http://schemas.openxmlformats.org/presentationml/2006/main">
   <p:cSld>
     <p:bg>
@@ -21861,21 +23579,8 @@
                   <a:srgbClr val="FFFFFF"/>
                 </a:solidFill>
               </a:rPr>
-              <a:t>Diversifiers </a:t>
+              <a:t>Diversifiers Identified using WARP and Sharpe</a:t>
             </a:r>
-            <a:r>
-              <a:rPr lang="en-US" sz="4000" dirty="0" err="1">
-                <a:solidFill>
-                  <a:srgbClr val="FFFFFF"/>
-                </a:solidFill>
-              </a:rPr>
-              <a:t>Idenitified</a:t>
-            </a:r>
-            <a:endParaRPr lang="en-US" sz="4000" dirty="0">
-              <a:solidFill>
-                <a:srgbClr val="FFFFFF"/>
-              </a:solidFill>
-            </a:endParaRPr>
           </a:p>
         </p:txBody>
       </p:sp>
@@ -21895,7 +23600,7 @@
             <p:ph idx="1"/>
             <p:extLst>
               <p:ext uri="{D42A27DB-BD31-4B8C-83A1-F6EECF244321}">
-                <p14:modId xmlns:p14="http://schemas.microsoft.com/office/powerpoint/2010/main" val="1564322130"/>
+                <p14:modId xmlns:p14="http://schemas.microsoft.com/office/powerpoint/2010/main" val="2545294148"/>
               </p:ext>
             </p:extLst>
           </p:nvPr>
@@ -21923,7 +23628,7 @@
 </p:sld>
 </file>
 
-<file path=ppt/slides/slide7.xml><?xml version="1.0" encoding="utf-8"?>
+<file path=ppt/slides/slide8.xml><?xml version="1.0" encoding="utf-8"?>
 <p:sld xmlns:a="http://schemas.openxmlformats.org/drawingml/2006/main" xmlns:r="http://schemas.openxmlformats.org/officeDocument/2006/relationships" xmlns:p="http://schemas.openxmlformats.org/presentationml/2006/main">
   <p:cSld>
     <p:bg>
@@ -22283,6 +23988,61 @@
           </a:prstGeom>
         </p:spPr>
       </p:pic>
+      <p:sp>
+        <p:nvSpPr>
+          <p:cNvPr id="2" name="TextBox 1">
+            <a:extLst>
+              <a:ext uri="{FF2B5EF4-FFF2-40B4-BE49-F238E27FC236}">
+                <a16:creationId xmlns:a16="http://schemas.microsoft.com/office/drawing/2014/main" id="{6B539AF9-C01A-4FAD-9C00-C50ADCCD557D}"/>
+              </a:ext>
+            </a:extLst>
+          </p:cNvPr>
+          <p:cNvSpPr txBox="1"/>
+          <p:nvPr/>
+        </p:nvSpPr>
+        <p:spPr>
+          <a:xfrm>
+            <a:off x="8752640" y="3878981"/>
+            <a:ext cx="3157086" cy="1477328"/>
+          </a:xfrm>
+          <a:prstGeom prst="rect">
+            <a:avLst/>
+          </a:prstGeom>
+          <a:noFill/>
+        </p:spPr>
+        <p:txBody>
+          <a:bodyPr wrap="square" rtlCol="0">
+            <a:spAutoFit/>
+          </a:bodyPr>
+          <a:lstStyle/>
+          <a:p>
+            <a:r>
+              <a:rPr lang="en-US" dirty="0">
+                <a:solidFill>
+                  <a:schemeClr val="bg1"/>
+                </a:solidFill>
+              </a:rPr>
+              <a:t>portfolio with </a:t>
+            </a:r>
+            <a:r>
+              <a:rPr lang="en-US" dirty="0" err="1">
+                <a:solidFill>
+                  <a:schemeClr val="bg1"/>
+                </a:solidFill>
+              </a:rPr>
+              <a:t>tlt</a:t>
+            </a:r>
+            <a:r>
+              <a:rPr lang="en-US" dirty="0">
+                <a:solidFill>
+                  <a:schemeClr val="bg1"/>
+                </a:solidFill>
+              </a:rPr>
+              <a:t> (WARP) as the diversifier performs better than the market and portfolio with shy (Sharpe) performs the worst</a:t>
+            </a:r>
+          </a:p>
+        </p:txBody>
+      </p:sp>
     </p:spTree>
     <p:extLst>
       <p:ext uri="{BB962C8B-B14F-4D97-AF65-F5344CB8AC3E}">
@@ -22296,7 +24056,7 @@
 </p:sld>
 </file>
 
-<file path=ppt/slides/slide8.xml><?xml version="1.0" encoding="utf-8"?>
+<file path=ppt/slides/slide9.xml><?xml version="1.0" encoding="utf-8"?>
 <p:sld xmlns:a="http://schemas.openxmlformats.org/drawingml/2006/main" xmlns:r="http://schemas.openxmlformats.org/officeDocument/2006/relationships" xmlns:p="http://schemas.openxmlformats.org/presentationml/2006/main">
   <p:cSld>
     <p:bg>
@@ -22688,383 +24448,81 @@
           </a:prstGeom>
         </p:spPr>
       </p:pic>
+      <p:sp>
+        <p:nvSpPr>
+          <p:cNvPr id="9" name="TextBox 8">
+            <a:extLst>
+              <a:ext uri="{FF2B5EF4-FFF2-40B4-BE49-F238E27FC236}">
+                <a16:creationId xmlns:a16="http://schemas.microsoft.com/office/drawing/2014/main" id="{D8E1FB10-7837-4F5A-9518-8B548A3613B1}"/>
+              </a:ext>
+            </a:extLst>
+          </p:cNvPr>
+          <p:cNvSpPr txBox="1"/>
+          <p:nvPr/>
+        </p:nvSpPr>
+        <p:spPr>
+          <a:xfrm>
+            <a:off x="8230787" y="4210070"/>
+            <a:ext cx="3157086" cy="1477328"/>
+          </a:xfrm>
+          <a:prstGeom prst="rect">
+            <a:avLst/>
+          </a:prstGeom>
+          <a:noFill/>
+        </p:spPr>
+        <p:txBody>
+          <a:bodyPr wrap="square" rtlCol="0">
+            <a:spAutoFit/>
+          </a:bodyPr>
+          <a:lstStyle/>
+          <a:p>
+            <a:r>
+              <a:rPr lang="en-US" dirty="0">
+                <a:solidFill>
+                  <a:schemeClr val="bg1"/>
+                </a:solidFill>
+              </a:rPr>
+              <a:t>portfolio with </a:t>
+            </a:r>
+            <a:r>
+              <a:rPr lang="en-US" dirty="0" err="1">
+                <a:solidFill>
+                  <a:schemeClr val="bg1"/>
+                </a:solidFill>
+              </a:rPr>
+              <a:t>tlt</a:t>
+            </a:r>
+            <a:r>
+              <a:rPr lang="en-US" dirty="0">
+                <a:solidFill>
+                  <a:schemeClr val="bg1"/>
+                </a:solidFill>
+              </a:rPr>
+              <a:t> (WARP) and </a:t>
+            </a:r>
+            <a:r>
+              <a:rPr lang="en-US" dirty="0" err="1">
+                <a:solidFill>
+                  <a:schemeClr val="bg1"/>
+                </a:solidFill>
+              </a:rPr>
+              <a:t>gld</a:t>
+            </a:r>
+            <a:r>
+              <a:rPr lang="en-US" dirty="0">
+                <a:solidFill>
+                  <a:schemeClr val="bg1"/>
+                </a:solidFill>
+              </a:rPr>
+              <a:t> (WARP) as the diversifier performs better than the market and provide more downside protection</a:t>
+            </a:r>
+          </a:p>
+        </p:txBody>
+      </p:sp>
     </p:spTree>
     <p:extLst>
       <p:ext uri="{BB962C8B-B14F-4D97-AF65-F5344CB8AC3E}">
         <p14:creationId xmlns:p14="http://schemas.microsoft.com/office/powerpoint/2010/main" val="3146264759"/>
-      </p:ext>
-    </p:extLst>
-  </p:cSld>
-  <p:clrMapOvr>
-    <a:masterClrMapping/>
-  </p:clrMapOvr>
-</p:sld>
-</file>
-
-<file path=ppt/slides/slide9.xml><?xml version="1.0" encoding="utf-8"?>
-<p:sld xmlns:a="http://schemas.openxmlformats.org/drawingml/2006/main" xmlns:r="http://schemas.openxmlformats.org/officeDocument/2006/relationships" xmlns:p="http://schemas.openxmlformats.org/presentationml/2006/main">
-  <p:cSld>
-    <p:bg>
-      <p:bgPr>
-        <a:solidFill>
-          <a:schemeClr val="bg1"/>
-        </a:solidFill>
-        <a:effectLst/>
-      </p:bgPr>
-    </p:bg>
-    <p:spTree>
-      <p:nvGrpSpPr>
-        <p:cNvPr id="1" name=""/>
-        <p:cNvGrpSpPr/>
-        <p:nvPr/>
-      </p:nvGrpSpPr>
-      <p:grpSpPr>
-        <a:xfrm>
-          <a:off x="0" y="0"/>
-          <a:ext cx="0" cy="0"/>
-          <a:chOff x="0" y="0"/>
-          <a:chExt cx="0" cy="0"/>
-        </a:xfrm>
-      </p:grpSpPr>
-      <p:sp useBgFill="1">
-        <p:nvSpPr>
-          <p:cNvPr id="10" name="Rectangle 9">
-            <a:extLst>
-              <a:ext uri="{FF2B5EF4-FFF2-40B4-BE49-F238E27FC236}">
-                <a16:creationId xmlns:a16="http://schemas.microsoft.com/office/drawing/2014/main" id="{AB8C311F-7253-4AED-9701-7FC0708C41C7}"/>
-              </a:ext>
-              <a:ext uri="{C183D7F6-B498-43B3-948B-1728B52AA6E4}">
-                <adec:decorative xmlns:adec="http://schemas.microsoft.com/office/drawing/2017/decorative" val="1"/>
-              </a:ext>
-            </a:extLst>
-          </p:cNvPr>
-          <p:cNvSpPr>
-            <a:spLocks noGrp="1" noRot="1" noChangeAspect="1" noMove="1" noResize="1" noEditPoints="1" noAdjustHandles="1" noChangeArrowheads="1" noChangeShapeType="1" noTextEdit="1"/>
-          </p:cNvSpPr>
-          <p:nvPr>
-            <p:extLst>
-              <p:ext uri="{386F3935-93C4-4BCD-93E2-E3B085C9AB24}">
-                <p16:designElem xmlns:p16="http://schemas.microsoft.com/office/powerpoint/2015/main" val="1"/>
-              </p:ext>
-            </p:extLst>
-          </p:nvPr>
-        </p:nvSpPr>
-        <p:spPr>
-          <a:xfrm>
-            <a:off x="0" y="0"/>
-            <a:ext cx="12192000" cy="6858000"/>
-          </a:xfrm>
-          <a:prstGeom prst="rect">
-            <a:avLst/>
-          </a:prstGeom>
-          <a:ln w="12700" cap="flat" cmpd="sng" algn="ctr">
-            <a:noFill/>
-            <a:prstDash val="solid"/>
-            <a:miter lim="800000"/>
-          </a:ln>
-          <a:effectLst/>
-          <a:extLst>
-            <a:ext uri="{91240B29-F687-4F45-9708-019B960494DF}">
-              <a14:hiddenLine xmlns:a14="http://schemas.microsoft.com/office/drawing/2010/main" w="12700" cap="flat" cmpd="sng" algn="ctr">
-                <a:solidFill>
-                  <a:schemeClr val="accent1">
-                    <a:shade val="50000"/>
-                  </a:schemeClr>
-                </a:solidFill>
-                <a:prstDash val="solid"/>
-                <a:miter lim="800000"/>
-              </a14:hiddenLine>
-            </a:ext>
-          </a:extLst>
-        </p:spPr>
-        <p:style>
-          <a:lnRef idx="2">
-            <a:schemeClr val="accent1">
-              <a:shade val="50000"/>
-            </a:schemeClr>
-          </a:lnRef>
-          <a:fillRef idx="1">
-            <a:schemeClr val="accent1"/>
-          </a:fillRef>
-          <a:effectRef idx="0">
-            <a:schemeClr val="accent1"/>
-          </a:effectRef>
-          <a:fontRef idx="minor">
-            <a:schemeClr val="lt1"/>
-          </a:fontRef>
-        </p:style>
-        <p:txBody>
-          <a:bodyPr rtlCol="0" anchor="ctr"/>
-          <a:lstStyle/>
-          <a:p>
-            <a:pPr algn="ctr"/>
-            <a:endParaRPr lang="en-US"/>
-          </a:p>
-        </p:txBody>
-      </p:sp>
-      <p:sp>
-        <p:nvSpPr>
-          <p:cNvPr id="12" name="Rectangle 11">
-            <a:extLst>
-              <a:ext uri="{FF2B5EF4-FFF2-40B4-BE49-F238E27FC236}">
-                <a16:creationId xmlns:a16="http://schemas.microsoft.com/office/drawing/2014/main" id="{E2384209-CB15-4CDF-9D31-C44FD9A3F20D}"/>
-              </a:ext>
-              <a:ext uri="{C183D7F6-B498-43B3-948B-1728B52AA6E4}">
-                <adec:decorative xmlns:adec="http://schemas.microsoft.com/office/drawing/2017/decorative" val="1"/>
-              </a:ext>
-            </a:extLst>
-          </p:cNvPr>
-          <p:cNvSpPr>
-            <a:spLocks noGrp="1" noRot="1" noChangeAspect="1" noMove="1" noResize="1" noEditPoints="1" noAdjustHandles="1" noChangeArrowheads="1" noChangeShapeType="1" noTextEdit="1"/>
-          </p:cNvSpPr>
-          <p:nvPr>
-            <p:extLst>
-              <p:ext uri="{386F3935-93C4-4BCD-93E2-E3B085C9AB24}">
-                <p16:designElem xmlns:p16="http://schemas.microsoft.com/office/powerpoint/2015/main" val="1"/>
-              </p:ext>
-            </p:extLst>
-          </p:nvPr>
-        </p:nvSpPr>
-        <p:spPr>
-          <a:xfrm rot="16200000" flipH="1">
-            <a:off x="2666617" y="-2666188"/>
-            <a:ext cx="6858000" cy="12191233"/>
-          </a:xfrm>
-          <a:prstGeom prst="rect">
-            <a:avLst/>
-          </a:prstGeom>
-          <a:gradFill>
-            <a:gsLst>
-              <a:gs pos="8000">
-                <a:schemeClr val="accent1"/>
-              </a:gs>
-              <a:gs pos="100000">
-                <a:schemeClr val="accent1">
-                  <a:lumMod val="50000"/>
-                </a:schemeClr>
-              </a:gs>
-            </a:gsLst>
-            <a:lin ang="12000000" scaled="0"/>
-          </a:gradFill>
-          <a:ln>
-            <a:noFill/>
-          </a:ln>
-        </p:spPr>
-        <p:style>
-          <a:lnRef idx="2">
-            <a:schemeClr val="accent1">
-              <a:shade val="50000"/>
-            </a:schemeClr>
-          </a:lnRef>
-          <a:fillRef idx="1">
-            <a:schemeClr val="accent1"/>
-          </a:fillRef>
-          <a:effectRef idx="0">
-            <a:schemeClr val="accent1"/>
-          </a:effectRef>
-          <a:fontRef idx="minor">
-            <a:schemeClr val="lt1"/>
-          </a:fontRef>
-        </p:style>
-        <p:txBody>
-          <a:bodyPr rtlCol="0" anchor="ctr"/>
-          <a:lstStyle/>
-          <a:p>
-            <a:pPr algn="ctr"/>
-            <a:endParaRPr lang="en-US"/>
-          </a:p>
-        </p:txBody>
-      </p:sp>
-      <p:sp>
-        <p:nvSpPr>
-          <p:cNvPr id="14" name="Rectangle 13">
-            <a:extLst>
-              <a:ext uri="{FF2B5EF4-FFF2-40B4-BE49-F238E27FC236}">
-                <a16:creationId xmlns:a16="http://schemas.microsoft.com/office/drawing/2014/main" id="{2633B3B5-CC90-43F0-8714-D31D1F3F0209}"/>
-              </a:ext>
-              <a:ext uri="{C183D7F6-B498-43B3-948B-1728B52AA6E4}">
-                <adec:decorative xmlns:adec="http://schemas.microsoft.com/office/drawing/2017/decorative" val="1"/>
-              </a:ext>
-            </a:extLst>
-          </p:cNvPr>
-          <p:cNvSpPr>
-            <a:spLocks noGrp="1" noRot="1" noChangeAspect="1" noMove="1" noResize="1" noEditPoints="1" noAdjustHandles="1" noChangeArrowheads="1" noChangeShapeType="1" noTextEdit="1"/>
-          </p:cNvSpPr>
-          <p:nvPr>
-            <p:extLst>
-              <p:ext uri="{386F3935-93C4-4BCD-93E2-E3B085C9AB24}">
-                <p16:designElem xmlns:p16="http://schemas.microsoft.com/office/powerpoint/2015/main" val="1"/>
-              </p:ext>
-            </p:extLst>
-          </p:nvPr>
-        </p:nvSpPr>
-        <p:spPr>
-          <a:xfrm rot="10800000" flipH="1">
-            <a:off x="-2311" y="0"/>
-            <a:ext cx="9070846" cy="6857572"/>
-          </a:xfrm>
-          <a:prstGeom prst="rect">
-            <a:avLst/>
-          </a:prstGeom>
-          <a:gradFill>
-            <a:gsLst>
-              <a:gs pos="8000">
-                <a:srgbClr val="000000">
-                  <a:alpha val="52000"/>
-                </a:srgbClr>
-              </a:gs>
-              <a:gs pos="100000">
-                <a:schemeClr val="accent1"/>
-              </a:gs>
-            </a:gsLst>
-            <a:lin ang="4800000" scaled="0"/>
-          </a:gradFill>
-          <a:ln>
-            <a:noFill/>
-          </a:ln>
-        </p:spPr>
-        <p:style>
-          <a:lnRef idx="2">
-            <a:schemeClr val="accent1">
-              <a:shade val="50000"/>
-            </a:schemeClr>
-          </a:lnRef>
-          <a:fillRef idx="1">
-            <a:schemeClr val="accent1"/>
-          </a:fillRef>
-          <a:effectRef idx="0">
-            <a:schemeClr val="accent1"/>
-          </a:effectRef>
-          <a:fontRef idx="minor">
-            <a:schemeClr val="lt1"/>
-          </a:fontRef>
-        </p:style>
-        <p:txBody>
-          <a:bodyPr rtlCol="0" anchor="ctr"/>
-          <a:lstStyle/>
-          <a:p>
-            <a:pPr algn="ctr"/>
-            <a:endParaRPr lang="en-US"/>
-          </a:p>
-        </p:txBody>
-      </p:sp>
-      <p:sp>
-        <p:nvSpPr>
-          <p:cNvPr id="16" name="Rectangle 15">
-            <a:extLst>
-              <a:ext uri="{FF2B5EF4-FFF2-40B4-BE49-F238E27FC236}">
-                <a16:creationId xmlns:a16="http://schemas.microsoft.com/office/drawing/2014/main" id="{A8D57A06-A426-446D-B02C-A2DC6B62E45E}"/>
-              </a:ext>
-              <a:ext uri="{C183D7F6-B498-43B3-948B-1728B52AA6E4}">
-                <adec:decorative xmlns:adec="http://schemas.microsoft.com/office/drawing/2017/decorative" val="1"/>
-              </a:ext>
-            </a:extLst>
-          </p:cNvPr>
-          <p:cNvSpPr>
-            <a:spLocks noGrp="1" noRot="1" noChangeAspect="1" noMove="1" noResize="1" noEditPoints="1" noAdjustHandles="1" noChangeArrowheads="1" noChangeShapeType="1" noTextEdit="1"/>
-          </p:cNvSpPr>
-          <p:nvPr>
-            <p:extLst>
-              <p:ext uri="{386F3935-93C4-4BCD-93E2-E3B085C9AB24}">
-                <p16:designElem xmlns:p16="http://schemas.microsoft.com/office/powerpoint/2015/main" val="1"/>
-              </p:ext>
-            </p:extLst>
-          </p:nvPr>
-        </p:nvSpPr>
-        <p:spPr>
-          <a:xfrm rot="16200000" flipH="1">
-            <a:off x="3649491" y="-1685840"/>
-            <a:ext cx="4894564" cy="12193546"/>
-          </a:xfrm>
-          <a:prstGeom prst="rect">
-            <a:avLst/>
-          </a:prstGeom>
-          <a:gradFill>
-            <a:gsLst>
-              <a:gs pos="0">
-                <a:schemeClr val="accent5">
-                  <a:lumMod val="60000"/>
-                  <a:lumOff val="40000"/>
-                  <a:alpha val="0"/>
-                </a:schemeClr>
-              </a:gs>
-              <a:gs pos="100000">
-                <a:srgbClr val="000000">
-                  <a:alpha val="46000"/>
-                </a:srgbClr>
-              </a:gs>
-            </a:gsLst>
-            <a:lin ang="1200000" scaled="0"/>
-          </a:gradFill>
-          <a:ln>
-            <a:noFill/>
-          </a:ln>
-        </p:spPr>
-        <p:style>
-          <a:lnRef idx="2">
-            <a:schemeClr val="accent1">
-              <a:shade val="50000"/>
-            </a:schemeClr>
-          </a:lnRef>
-          <a:fillRef idx="1">
-            <a:schemeClr val="accent1"/>
-          </a:fillRef>
-          <a:effectRef idx="0">
-            <a:schemeClr val="accent1"/>
-          </a:effectRef>
-          <a:fontRef idx="minor">
-            <a:schemeClr val="lt1"/>
-          </a:fontRef>
-        </p:style>
-        <p:txBody>
-          <a:bodyPr rtlCol="0" anchor="ctr"/>
-          <a:lstStyle/>
-          <a:p>
-            <a:pPr algn="ctr"/>
-            <a:endParaRPr lang="en-US"/>
-          </a:p>
-        </p:txBody>
-      </p:sp>
-      <p:pic>
-        <p:nvPicPr>
-          <p:cNvPr id="3" name="Picture 2" descr="Chart&#10;&#10;Description automatically generated">
-            <a:extLst>
-              <a:ext uri="{FF2B5EF4-FFF2-40B4-BE49-F238E27FC236}">
-                <a16:creationId xmlns:a16="http://schemas.microsoft.com/office/drawing/2014/main" id="{8F7F74C1-635B-4556-B03A-F48C00F114F2}"/>
-              </a:ext>
-            </a:extLst>
-          </p:cNvPr>
-          <p:cNvPicPr>
-            <a:picLocks noChangeAspect="1"/>
-          </p:cNvPicPr>
-          <p:nvPr/>
-        </p:nvPicPr>
-        <p:blipFill>
-          <a:blip r:embed="rId2">
-            <a:extLst>
-              <a:ext uri="{28A0092B-C50C-407E-A947-70E740481C1C}">
-                <a14:useLocalDpi xmlns:a14="http://schemas.microsoft.com/office/drawing/2010/main" val="0"/>
-              </a:ext>
-            </a:extLst>
-          </a:blip>
-          <a:stretch>
-            <a:fillRect/>
-          </a:stretch>
-        </p:blipFill>
-        <p:spPr>
-          <a:xfrm>
-            <a:off x="406876" y="676432"/>
-            <a:ext cx="10607241" cy="5654719"/>
-          </a:xfrm>
-          <a:prstGeom prst="rect">
-            <a:avLst/>
-          </a:prstGeom>
-        </p:spPr>
-      </p:pic>
-    </p:spTree>
-    <p:extLst>
-      <p:ext uri="{BB962C8B-B14F-4D97-AF65-F5344CB8AC3E}">
-        <p14:creationId xmlns:p14="http://schemas.microsoft.com/office/powerpoint/2010/main" val="761059145"/>
       </p:ext>
     </p:extLst>
   </p:cSld>

</xml_diff>